<commit_message>
Update How accurately can we predict mental health conditions.pptx
</commit_message>
<xml_diff>
--- a/IMIKT - Методологија на истражувањето во ИКТ/Predicting Mental Health in Tech/How accurately can we predict mental health conditions.pptx
+++ b/IMIKT - Методологија на истражувањето во ИКТ/Predicting Mental Health in Tech/How accurately can we predict mental health conditions.pptx
@@ -117,6 +117,11 @@
       </a:defRPr>
     </a:lvl9pPr>
   </p:defaultTextStyle>
+  <p:extLst>
+    <p:ext uri="{EFAFB233-063F-42B5-8137-9DF3F51BA10A}">
+      <p15:sldGuideLst xmlns:p15="http://schemas.microsoft.com/office/powerpoint/2012/main"/>
+    </p:ext>
+  </p:extLst>
 </p:presentation>
 </file>
 
@@ -202,7 +207,7 @@
           <a:p>
             <a:fld id="{3C007DB8-D89E-4C96-8971-D3BE16C19C44}" type="datetimeFigureOut">
               <a:rPr lang="en-US" smtClean="0"/>
-              <a:t>2/2/2025</a:t>
+              <a:t>2/3/2025</a:t>
             </a:fld>
             <a:endParaRPr lang="en-US"/>
           </a:p>
@@ -700,7 +705,7 @@
           <a:p>
             <a:fld id="{F9119F75-FDC2-44AA-925F-7004D7B308A9}" type="datetimeFigureOut">
               <a:rPr lang="en-US" smtClean="0"/>
-              <a:t>2/2/2025</a:t>
+              <a:t>2/3/2025</a:t>
             </a:fld>
             <a:endParaRPr lang="en-US"/>
           </a:p>
@@ -898,7 +903,7 @@
           <a:p>
             <a:fld id="{F9119F75-FDC2-44AA-925F-7004D7B308A9}" type="datetimeFigureOut">
               <a:rPr lang="en-US" smtClean="0"/>
-              <a:t>2/2/2025</a:t>
+              <a:t>2/3/2025</a:t>
             </a:fld>
             <a:endParaRPr lang="en-US"/>
           </a:p>
@@ -1106,7 +1111,7 @@
           <a:p>
             <a:fld id="{F9119F75-FDC2-44AA-925F-7004D7B308A9}" type="datetimeFigureOut">
               <a:rPr lang="en-US" smtClean="0"/>
-              <a:t>2/2/2025</a:t>
+              <a:t>2/3/2025</a:t>
             </a:fld>
             <a:endParaRPr lang="en-US"/>
           </a:p>
@@ -1304,7 +1309,7 @@
           <a:p>
             <a:fld id="{F9119F75-FDC2-44AA-925F-7004D7B308A9}" type="datetimeFigureOut">
               <a:rPr lang="en-US" smtClean="0"/>
-              <a:t>2/2/2025</a:t>
+              <a:t>2/3/2025</a:t>
             </a:fld>
             <a:endParaRPr lang="en-US"/>
           </a:p>
@@ -1579,7 +1584,7 @@
           <a:p>
             <a:fld id="{F9119F75-FDC2-44AA-925F-7004D7B308A9}" type="datetimeFigureOut">
               <a:rPr lang="en-US" smtClean="0"/>
-              <a:t>2/2/2025</a:t>
+              <a:t>2/3/2025</a:t>
             </a:fld>
             <a:endParaRPr lang="en-US"/>
           </a:p>
@@ -1844,7 +1849,7 @@
           <a:p>
             <a:fld id="{F9119F75-FDC2-44AA-925F-7004D7B308A9}" type="datetimeFigureOut">
               <a:rPr lang="en-US" smtClean="0"/>
-              <a:t>2/2/2025</a:t>
+              <a:t>2/3/2025</a:t>
             </a:fld>
             <a:endParaRPr lang="en-US"/>
           </a:p>
@@ -2256,7 +2261,7 @@
           <a:p>
             <a:fld id="{F9119F75-FDC2-44AA-925F-7004D7B308A9}" type="datetimeFigureOut">
               <a:rPr lang="en-US" smtClean="0"/>
-              <a:t>2/2/2025</a:t>
+              <a:t>2/3/2025</a:t>
             </a:fld>
             <a:endParaRPr lang="en-US"/>
           </a:p>
@@ -2397,7 +2402,7 @@
           <a:p>
             <a:fld id="{F9119F75-FDC2-44AA-925F-7004D7B308A9}" type="datetimeFigureOut">
               <a:rPr lang="en-US" smtClean="0"/>
-              <a:t>2/2/2025</a:t>
+              <a:t>2/3/2025</a:t>
             </a:fld>
             <a:endParaRPr lang="en-US"/>
           </a:p>
@@ -2510,7 +2515,7 @@
           <a:p>
             <a:fld id="{F9119F75-FDC2-44AA-925F-7004D7B308A9}" type="datetimeFigureOut">
               <a:rPr lang="en-US" smtClean="0"/>
-              <a:t>2/2/2025</a:t>
+              <a:t>2/3/2025</a:t>
             </a:fld>
             <a:endParaRPr lang="en-US"/>
           </a:p>
@@ -2821,7 +2826,7 @@
           <a:p>
             <a:fld id="{F9119F75-FDC2-44AA-925F-7004D7B308A9}" type="datetimeFigureOut">
               <a:rPr lang="en-US" smtClean="0"/>
-              <a:t>2/2/2025</a:t>
+              <a:t>2/3/2025</a:t>
             </a:fld>
             <a:endParaRPr lang="en-US"/>
           </a:p>
@@ -3109,7 +3114,7 @@
           <a:p>
             <a:fld id="{F9119F75-FDC2-44AA-925F-7004D7B308A9}" type="datetimeFigureOut">
               <a:rPr lang="en-US" smtClean="0"/>
-              <a:t>2/2/2025</a:t>
+              <a:t>2/3/2025</a:t>
             </a:fld>
             <a:endParaRPr lang="en-US"/>
           </a:p>
@@ -3350,7 +3355,7 @@
           <a:p>
             <a:fld id="{F9119F75-FDC2-44AA-925F-7004D7B308A9}" type="datetimeFigureOut">
               <a:rPr lang="en-US" smtClean="0"/>
-              <a:t>2/2/2025</a:t>
+              <a:t>2/3/2025</a:t>
             </a:fld>
             <a:endParaRPr lang="en-US"/>
           </a:p>
@@ -3859,17 +3864,20 @@
         </p:spPr>
         <p:txBody>
           <a:bodyPr>
-            <a:normAutofit/>
+            <a:normAutofit fontScale="90000"/>
           </a:bodyPr>
           <a:lstStyle/>
           <a:p>
             <a:pPr algn="l"/>
             <a:r>
-              <a:rPr lang="en-US" sz="4400" dirty="0">
-                <a:latin typeface="Apparat Heavy" panose="00000A00000000000000" pitchFamily="50" charset="0"/>
-              </a:rPr>
-              <a:t>How accurately can we predict mental health conditions in employees who work remotely?</a:t>
-            </a:r>
+              <a:rPr lang="ru-RU" sz="4400" b="1" dirty="0">
+                <a:latin typeface="Apparat" panose="00000500000000000000" pitchFamily="50" charset="0"/>
+              </a:rPr>
+              <a:t>Колку точно можеме да предвидиме ментални здравствени состојби кај вработени кои работат од далечина, користејќи податоци од анкета?</a:t>
+            </a:r>
+            <a:endParaRPr lang="en-US" sz="4400" b="1" dirty="0">
+              <a:latin typeface="Apparat" panose="00000500000000000000" pitchFamily="50" charset="0"/>
+            </a:endParaRPr>
           </a:p>
         </p:txBody>
       </p:sp>
@@ -3903,7 +3911,7 @@
           <a:p>
             <a:pPr algn="l"/>
             <a:r>
-              <a:rPr lang="en-US"/>
+              <a:rPr lang="en-US" dirty="0"/>
               <a:t>Nikola Ivanov - Ilija Trajkovski - Berat Ahmetaj</a:t>
             </a:r>
           </a:p>
@@ -4279,8 +4287,8 @@
         </p:blipFill>
         <p:spPr bwMode="auto">
           <a:xfrm>
-            <a:off x="6947795" y="1995680"/>
-            <a:ext cx="5096215" cy="2866639"/>
+            <a:off x="7233851" y="1995680"/>
+            <a:ext cx="4810159" cy="2866639"/>
           </a:xfrm>
           <a:prstGeom prst="rect">
             <a:avLst/>
@@ -4602,7 +4610,7 @@
           <a:lstStyle/>
           <a:p>
             <a:br>
-              <a:rPr lang="en-US" sz="2400" dirty="0">
+              <a:rPr lang="en-US" sz="2000" dirty="0">
                 <a:solidFill>
                   <a:schemeClr val="bg1"/>
                 </a:solidFill>
@@ -4610,16 +4618,16 @@
               </a:rPr>
             </a:br>
             <a:r>
-              <a:rPr lang="en-US" sz="2400" dirty="0">
-                <a:solidFill>
-                  <a:schemeClr val="bg1"/>
-                </a:solidFill>
-                <a:latin typeface="Apparat" panose="00000500000000000000" pitchFamily="50" charset="0"/>
-              </a:rPr>
-              <a:t>High job satisfaction reduces mental health issues </a:t>
+              <a:rPr lang="ru-RU" sz="2000" dirty="0">
+                <a:solidFill>
+                  <a:schemeClr val="bg1"/>
+                </a:solidFill>
+                <a:latin typeface="Apparat" panose="00000500000000000000" pitchFamily="50" charset="0"/>
+              </a:rPr>
+              <a:t>Високото задоволство од работата ги намалува менталните здравствени проблеми</a:t>
             </a:r>
             <a:br>
-              <a:rPr lang="en-US" sz="2400" dirty="0">
+              <a:rPr lang="en-US" sz="2000" dirty="0">
                 <a:solidFill>
                   <a:schemeClr val="bg1"/>
                 </a:solidFill>
@@ -4627,16 +4635,16 @@
               </a:rPr>
             </a:br>
             <a:r>
-              <a:rPr lang="en-US" sz="2400" b="1" dirty="0">
-                <a:solidFill>
-                  <a:srgbClr val="00B050"/>
-                </a:solidFill>
-                <a:latin typeface="Apparat" panose="00000500000000000000" pitchFamily="50" charset="0"/>
-              </a:rPr>
-              <a:t>Supported</a:t>
+              <a:rPr lang="ru-RU" sz="2000" b="1" dirty="0">
+                <a:solidFill>
+                  <a:srgbClr val="48D24D"/>
+                </a:solidFill>
+                <a:latin typeface="Apparat" panose="00000500000000000000" pitchFamily="50" charset="0"/>
+              </a:rPr>
+              <a:t>Поддржано</a:t>
             </a:r>
             <a:br>
-              <a:rPr lang="en-US" sz="2400" dirty="0">
+              <a:rPr lang="en-US" sz="2000" dirty="0">
                 <a:solidFill>
                   <a:schemeClr val="bg1"/>
                 </a:solidFill>
@@ -4644,7 +4652,7 @@
               </a:rPr>
             </a:br>
             <a:br>
-              <a:rPr lang="en-US" sz="2400" dirty="0">
+              <a:rPr lang="ru-RU" sz="2000" dirty="0">
                 <a:solidFill>
                   <a:schemeClr val="bg1"/>
                 </a:solidFill>
@@ -4652,16 +4660,34 @@
               </a:rPr>
             </a:br>
             <a:r>
-              <a:rPr lang="en-US" sz="2400" dirty="0">
-                <a:solidFill>
-                  <a:schemeClr val="bg1"/>
-                </a:solidFill>
-                <a:latin typeface="Apparat" panose="00000500000000000000" pitchFamily="50" charset="0"/>
-              </a:rPr>
-              <a:t>Mental health is better onsite: </a:t>
+              <a:rPr lang="ru-RU" sz="2000" dirty="0">
+                <a:solidFill>
+                  <a:schemeClr val="bg1"/>
+                </a:solidFill>
+                <a:latin typeface="Apparat" panose="00000500000000000000" pitchFamily="50" charset="0"/>
+              </a:rPr>
+              <a:t>Менталното здравје е подобро на локација (</a:t>
+            </a:r>
+            <a:r>
+              <a:rPr lang="en-US" sz="2000" dirty="0">
+                <a:solidFill>
+                  <a:schemeClr val="bg1"/>
+                </a:solidFill>
+                <a:latin typeface="Apparat" panose="00000500000000000000" pitchFamily="50" charset="0"/>
+              </a:rPr>
+              <a:t>Onsite</a:t>
+            </a:r>
+            <a:r>
+              <a:rPr lang="ru-RU" sz="2000" dirty="0">
+                <a:solidFill>
+                  <a:schemeClr val="bg1"/>
+                </a:solidFill>
+                <a:latin typeface="Apparat" panose="00000500000000000000" pitchFamily="50" charset="0"/>
+              </a:rPr>
+              <a:t>)</a:t>
             </a:r>
             <a:br>
-              <a:rPr lang="en-US" sz="2400" dirty="0">
+              <a:rPr lang="en-US" sz="2000" dirty="0">
                 <a:solidFill>
                   <a:schemeClr val="bg1"/>
                 </a:solidFill>
@@ -4669,27 +4695,19 @@
               </a:rPr>
             </a:br>
             <a:r>
-              <a:rPr lang="en-US" sz="2400" b="1" dirty="0">
-                <a:solidFill>
-                  <a:schemeClr val="bg1">
-                    <a:lumMod val="75000"/>
+              <a:rPr lang="ru-RU" sz="2000" b="1" dirty="0">
+                <a:solidFill>
+                  <a:schemeClr val="tx1">
+                    <a:lumMod val="50000"/>
+                    <a:lumOff val="50000"/>
                   </a:schemeClr>
                 </a:solidFill>
                 <a:latin typeface="Apparat" panose="00000500000000000000" pitchFamily="50" charset="0"/>
               </a:rPr>
-              <a:t>Mixed</a:t>
-            </a:r>
-            <a:r>
-              <a:rPr lang="en-US" sz="2400" dirty="0">
-                <a:solidFill>
-                  <a:schemeClr val="bg1"/>
-                </a:solidFill>
-                <a:latin typeface="Apparat" panose="00000500000000000000" pitchFamily="50" charset="0"/>
-              </a:rPr>
-              <a:t> (varied responses)</a:t>
+              <a:t>Мешано</a:t>
             </a:r>
             <a:br>
-              <a:rPr lang="en-US" sz="2400" dirty="0">
+              <a:rPr lang="en-US" sz="2000" dirty="0">
                 <a:solidFill>
                   <a:schemeClr val="bg1"/>
                 </a:solidFill>
@@ -4697,7 +4715,7 @@
               </a:rPr>
             </a:br>
             <a:br>
-              <a:rPr lang="en-US" sz="2400" dirty="0">
+              <a:rPr lang="ru-RU" sz="2000" dirty="0">
                 <a:solidFill>
                   <a:schemeClr val="bg1"/>
                 </a:solidFill>
@@ -4705,16 +4723,16 @@
               </a:rPr>
             </a:br>
             <a:r>
-              <a:rPr lang="en-US" sz="2400" dirty="0">
-                <a:solidFill>
-                  <a:schemeClr val="bg1"/>
-                </a:solidFill>
-                <a:latin typeface="Apparat" panose="00000500000000000000" pitchFamily="50" charset="0"/>
-              </a:rPr>
-              <a:t>Mental health is better remote: </a:t>
+              <a:rPr lang="ru-RU" sz="2000" dirty="0">
+                <a:solidFill>
+                  <a:schemeClr val="bg1"/>
+                </a:solidFill>
+                <a:latin typeface="Apparat" panose="00000500000000000000" pitchFamily="50" charset="0"/>
+              </a:rPr>
+              <a:t>Менталното здравје е подобро оддалечено</a:t>
             </a:r>
             <a:br>
-              <a:rPr lang="en-US" sz="2400" dirty="0">
+              <a:rPr lang="en-US" sz="2000" dirty="0">
                 <a:solidFill>
                   <a:schemeClr val="bg1"/>
                 </a:solidFill>
@@ -4722,16 +4740,16 @@
               </a:rPr>
             </a:br>
             <a:r>
-              <a:rPr lang="en-US" sz="2400" b="1" dirty="0">
+              <a:rPr lang="ru-RU" sz="2000" b="1" dirty="0">
                 <a:solidFill>
                   <a:srgbClr val="FF0000"/>
                 </a:solidFill>
                 <a:latin typeface="Apparat" panose="00000500000000000000" pitchFamily="50" charset="0"/>
               </a:rPr>
-              <a:t>Not Supported</a:t>
+              <a:t>Не е поддржано</a:t>
             </a:r>
             <a:br>
-              <a:rPr lang="en-US" sz="2400" dirty="0">
+              <a:rPr lang="en-US" sz="2000" dirty="0">
                 <a:solidFill>
                   <a:schemeClr val="bg1"/>
                 </a:solidFill>
@@ -4739,7 +4757,7 @@
               </a:rPr>
             </a:br>
             <a:br>
-              <a:rPr lang="en-US" sz="2400" dirty="0">
+              <a:rPr lang="ru-RU" sz="2000" dirty="0">
                 <a:solidFill>
                   <a:schemeClr val="bg1"/>
                 </a:solidFill>
@@ -4747,16 +4765,16 @@
               </a:rPr>
             </a:br>
             <a:r>
-              <a:rPr lang="en-US" sz="2400" dirty="0">
-                <a:solidFill>
-                  <a:schemeClr val="bg1"/>
-                </a:solidFill>
-                <a:latin typeface="Apparat" panose="00000500000000000000" pitchFamily="50" charset="0"/>
-              </a:rPr>
-              <a:t>Stress and isolation increase mental health issues: </a:t>
+              <a:rPr lang="ru-RU" sz="2000" dirty="0">
+                <a:solidFill>
+                  <a:schemeClr val="bg1"/>
+                </a:solidFill>
+                <a:latin typeface="Apparat" panose="00000500000000000000" pitchFamily="50" charset="0"/>
+              </a:rPr>
+              <a:t>Стресот и изолацијата го зголемуваат ризикот од ментални здравствени проблеми</a:t>
             </a:r>
             <a:br>
-              <a:rPr lang="en-US" sz="2400" dirty="0">
+              <a:rPr lang="en-US" sz="2000" dirty="0">
                 <a:solidFill>
                   <a:schemeClr val="bg1"/>
                 </a:solidFill>
@@ -4764,15 +4782,23 @@
               </a:rPr>
             </a:br>
             <a:r>
-              <a:rPr lang="en-US" sz="2400" b="1" dirty="0">
-                <a:solidFill>
-                  <a:schemeClr val="accent6"/>
-                </a:solidFill>
-                <a:latin typeface="Apparat" panose="00000500000000000000" pitchFamily="50" charset="0"/>
-              </a:rPr>
-              <a:t>Supported</a:t>
-            </a:r>
-            <a:endParaRPr lang="en-US" sz="2400" dirty="0">
+              <a:rPr lang="ru-RU" sz="2000" b="1" dirty="0">
+                <a:solidFill>
+                  <a:srgbClr val="48D24D"/>
+                </a:solidFill>
+                <a:latin typeface="Apparat" panose="00000500000000000000" pitchFamily="50" charset="0"/>
+              </a:rPr>
+              <a:t>Поддржано</a:t>
+            </a:r>
+            <a:br>
+              <a:rPr lang="ru-RU" sz="2000" dirty="0">
+                <a:solidFill>
+                  <a:schemeClr val="bg1"/>
+                </a:solidFill>
+                <a:latin typeface="Apparat" panose="00000500000000000000" pitchFamily="50" charset="0"/>
+              </a:rPr>
+            </a:br>
+            <a:endParaRPr lang="en-US" sz="2000" dirty="0">
               <a:solidFill>
                 <a:schemeClr val="bg1"/>
               </a:solidFill>
@@ -4933,8 +4959,8 @@
         </p:nvSpPr>
         <p:spPr>
           <a:xfrm>
-            <a:off x="235185" y="206246"/>
-            <a:ext cx="4973283" cy="1446550"/>
+            <a:off x="235185" y="371819"/>
+            <a:ext cx="4973283" cy="1077218"/>
           </a:xfrm>
           <a:prstGeom prst="rect">
             <a:avLst/>
@@ -4948,14 +4974,20 @@
           <a:lstStyle/>
           <a:p>
             <a:r>
-              <a:rPr lang="en-US" sz="4400" b="1" dirty="0">
-                <a:solidFill>
-                  <a:schemeClr val="bg1"/>
-                </a:solidFill>
-                <a:latin typeface="Apparat" panose="00000500000000000000" pitchFamily="50" charset="0"/>
-              </a:rPr>
-              <a:t>Hypothesis Testing Results</a:t>
-            </a:r>
+              <a:rPr lang="ru-RU" sz="3200" b="1" dirty="0">
+                <a:solidFill>
+                  <a:schemeClr val="bg1"/>
+                </a:solidFill>
+                <a:latin typeface="Apparat" panose="00000500000000000000" pitchFamily="50" charset="0"/>
+              </a:rPr>
+              <a:t>Резултати од Тестирање на Хипотези</a:t>
+            </a:r>
+            <a:endParaRPr lang="en-US" sz="3200" b="1" dirty="0">
+              <a:solidFill>
+                <a:schemeClr val="bg1"/>
+              </a:solidFill>
+              <a:latin typeface="Apparat" panose="00000500000000000000" pitchFamily="50" charset="0"/>
+            </a:endParaRPr>
           </a:p>
         </p:txBody>
       </p:sp>
@@ -5674,254 +5706,103 @@
           </a:bodyPr>
           <a:lstStyle/>
           <a:p>
-            <a:pPr marL="0" marR="0" lvl="0" indent="0" defTabSz="914400" rtl="0" eaLnBrk="0" fontAlgn="base" latinLnBrk="0" hangingPunct="0">
-              <a:spcBef>
-                <a:spcPct val="0"/>
-              </a:spcBef>
-              <a:spcAft>
-                <a:spcPts val="600"/>
-              </a:spcAft>
-              <a:buClrTx/>
-              <a:buSzTx/>
+            <a:pPr marL="0" indent="0">
               <a:buNone/>
-              <a:tabLst/>
             </a:pPr>
             <a:r>
-              <a:rPr kumimoji="0" lang="en-US" altLang="en-US" sz="2000" b="1" i="0" u="none" strike="noStrike" cap="none" normalizeH="0" baseline="0" dirty="0">
-                <a:ln>
-                  <a:noFill/>
-                </a:ln>
+              <a:rPr lang="ru-RU" sz="2000" b="1" dirty="0">
                 <a:solidFill>
                   <a:srgbClr val="00C6C5"/>
                 </a:solidFill>
-                <a:effectLst/>
-                <a:latin typeface="Apparat" panose="00000500000000000000" pitchFamily="50" charset="0"/>
-              </a:rPr>
-              <a:t>Background</a:t>
-            </a:r>
-            <a:r>
-              <a:rPr kumimoji="0" lang="en-US" altLang="en-US" sz="2000" b="1" i="0" u="none" strike="noStrike" cap="none" normalizeH="0" baseline="0" dirty="0">
-                <a:ln>
-                  <a:noFill/>
-                </a:ln>
-                <a:effectLst/>
+                <a:latin typeface="Apparat" panose="00000500000000000000" pitchFamily="50" charset="0"/>
+              </a:rPr>
+              <a:t>Цел</a:t>
+            </a:r>
+            <a:r>
+              <a:rPr lang="ru-RU" sz="2000" b="1" dirty="0">
                 <a:latin typeface="Apparat" panose="00000500000000000000" pitchFamily="50" charset="0"/>
               </a:rPr>
               <a:t>:</a:t>
             </a:r>
             <a:r>
-              <a:rPr kumimoji="0" lang="en-US" altLang="en-US" sz="2000" b="0" i="0" u="none" strike="noStrike" cap="none" normalizeH="0" baseline="0" dirty="0">
-                <a:ln>
-                  <a:noFill/>
-                </a:ln>
-                <a:effectLst/>
-                <a:latin typeface="Apparat" panose="00000500000000000000" pitchFamily="50" charset="0"/>
-              </a:rPr>
-              <a:t> Remote work is becoming increasingly common, but it brings unique challenges to workers' mental well-being.</a:t>
-            </a:r>
-          </a:p>
-          <a:p>
-            <a:pPr marL="0" marR="0" lvl="0" indent="0" defTabSz="914400" rtl="0" eaLnBrk="0" fontAlgn="base" latinLnBrk="0" hangingPunct="0">
-              <a:spcBef>
-                <a:spcPct val="0"/>
-              </a:spcBef>
-              <a:spcAft>
-                <a:spcPts val="600"/>
-              </a:spcAft>
-              <a:buClrTx/>
-              <a:buSzTx/>
-              <a:buNone/>
-              <a:tabLst/>
-            </a:pPr>
-            <a:endParaRPr kumimoji="0" lang="en-US" altLang="en-US" sz="2000" b="0" i="0" u="none" strike="noStrike" cap="none" normalizeH="0" baseline="0" dirty="0">
-              <a:ln>
-                <a:noFill/>
-              </a:ln>
-              <a:effectLst/>
+              <a:rPr lang="ru-RU" sz="2000" dirty="0">
+                <a:latin typeface="Apparat" panose="00000500000000000000" pitchFamily="50" charset="0"/>
+              </a:rPr>
+              <a:t> Да се истражи колку точно можеме да предвидиме ментални здравствени исходи кај оддалечените работници користејќи податоци од анкети за стрес, изолација и задоволство од работата.</a:t>
+            </a:r>
+            <a:endParaRPr lang="en-US" sz="2000" dirty="0">
               <a:latin typeface="Apparat" panose="00000500000000000000" pitchFamily="50" charset="0"/>
             </a:endParaRPr>
           </a:p>
           <a:p>
-            <a:pPr marL="0" marR="0" lvl="0" indent="0" defTabSz="914400" rtl="0" eaLnBrk="0" fontAlgn="base" latinLnBrk="0" hangingPunct="0">
-              <a:spcBef>
-                <a:spcPct val="0"/>
-              </a:spcBef>
-              <a:spcAft>
-                <a:spcPts val="600"/>
-              </a:spcAft>
-              <a:buClrTx/>
-              <a:buSzTx/>
+            <a:pPr marL="0" indent="0">
               <a:buNone/>
-              <a:tabLst/>
             </a:pPr>
-            <a:r>
-              <a:rPr kumimoji="0" lang="en-US" altLang="en-US" sz="2000" b="1" i="0" u="none" strike="noStrike" cap="none" normalizeH="0" baseline="0" dirty="0">
-                <a:ln>
-                  <a:noFill/>
-                </a:ln>
-                <a:solidFill>
-                  <a:srgbClr val="FF613A"/>
-                </a:solidFill>
-                <a:effectLst/>
-                <a:latin typeface="Apparat" panose="00000500000000000000" pitchFamily="50" charset="0"/>
-              </a:rPr>
-              <a:t>Objective</a:t>
-            </a:r>
-            <a:r>
-              <a:rPr kumimoji="0" lang="en-US" altLang="en-US" sz="2000" b="1" i="0" u="none" strike="noStrike" cap="none" normalizeH="0" baseline="0" dirty="0">
-                <a:ln>
-                  <a:noFill/>
-                </a:ln>
-                <a:effectLst/>
-                <a:latin typeface="Apparat" panose="00000500000000000000" pitchFamily="50" charset="0"/>
-              </a:rPr>
-              <a:t>:</a:t>
-            </a:r>
-            <a:r>
-              <a:rPr kumimoji="0" lang="en-US" altLang="en-US" sz="2000" b="0" i="0" u="none" strike="noStrike" cap="none" normalizeH="0" baseline="0" dirty="0">
-                <a:ln>
-                  <a:noFill/>
-                </a:ln>
-                <a:effectLst/>
-                <a:latin typeface="Apparat" panose="00000500000000000000" pitchFamily="50" charset="0"/>
-              </a:rPr>
-              <a:t> To explore how accurately we can predict mental health outcomes in remote workers using survey data on stress, isolation, and job satisfaction.</a:t>
-            </a:r>
-          </a:p>
-          <a:p>
-            <a:pPr marL="0" marR="0" lvl="0" indent="0" defTabSz="914400" rtl="0" eaLnBrk="0" fontAlgn="base" latinLnBrk="0" hangingPunct="0">
-              <a:spcBef>
-                <a:spcPct val="0"/>
-              </a:spcBef>
-              <a:spcAft>
-                <a:spcPts val="600"/>
-              </a:spcAft>
-              <a:buClrTx/>
-              <a:buSzTx/>
-              <a:buNone/>
-              <a:tabLst/>
-            </a:pPr>
-            <a:endParaRPr kumimoji="0" lang="en-US" altLang="en-US" sz="2000" b="0" i="0" u="none" strike="noStrike" cap="none" normalizeH="0" baseline="0" dirty="0">
-              <a:ln>
-                <a:noFill/>
-              </a:ln>
-              <a:effectLst/>
+            <a:endParaRPr lang="ru-RU" sz="2000" dirty="0">
               <a:latin typeface="Apparat" panose="00000500000000000000" pitchFamily="50" charset="0"/>
             </a:endParaRPr>
           </a:p>
           <a:p>
-            <a:pPr marL="0" marR="0" lvl="0" indent="0" defTabSz="914400" rtl="0" eaLnBrk="0" fontAlgn="base" latinLnBrk="0" hangingPunct="0">
-              <a:spcBef>
-                <a:spcPct val="0"/>
-              </a:spcBef>
-              <a:spcAft>
-                <a:spcPts val="600"/>
-              </a:spcAft>
-              <a:buClrTx/>
-              <a:buSzTx/>
+            <a:pPr marL="0" indent="0">
               <a:buNone/>
-              <a:tabLst/>
             </a:pPr>
             <a:r>
-              <a:rPr kumimoji="0" lang="en-US" altLang="en-US" sz="2000" b="1" i="0" u="none" strike="noStrike" cap="none" normalizeH="0" baseline="0" dirty="0">
-                <a:ln>
-                  <a:noFill/>
-                </a:ln>
-                <a:solidFill>
-                  <a:srgbClr val="296656"/>
-                </a:solidFill>
-                <a:effectLst/>
-                <a:latin typeface="Apparat" panose="00000500000000000000" pitchFamily="50" charset="0"/>
-              </a:rPr>
-              <a:t>Significance</a:t>
-            </a:r>
-            <a:r>
-              <a:rPr kumimoji="0" lang="en-US" altLang="en-US" sz="2000" b="1" i="0" u="none" strike="noStrike" cap="none" normalizeH="0" baseline="0" dirty="0">
-                <a:ln>
-                  <a:noFill/>
-                </a:ln>
-                <a:effectLst/>
+              <a:rPr lang="ru-RU" sz="2000" b="1" dirty="0">
+                <a:solidFill>
+                  <a:srgbClr val="FF613A"/>
+                </a:solidFill>
+                <a:latin typeface="Apparat" panose="00000500000000000000" pitchFamily="50" charset="0"/>
+              </a:rPr>
+              <a:t>Значајност</a:t>
+            </a:r>
+            <a:r>
+              <a:rPr lang="ru-RU" sz="2000" b="1" dirty="0">
                 <a:latin typeface="Apparat" panose="00000500000000000000" pitchFamily="50" charset="0"/>
               </a:rPr>
               <a:t>:</a:t>
             </a:r>
             <a:r>
-              <a:rPr kumimoji="0" lang="en-US" altLang="en-US" sz="2000" b="0" i="0" u="none" strike="noStrike" cap="none" normalizeH="0" baseline="0" dirty="0">
-                <a:ln>
-                  <a:noFill/>
-                </a:ln>
-                <a:effectLst/>
-                <a:latin typeface="Apparat" panose="00000500000000000000" pitchFamily="50" charset="0"/>
-              </a:rPr>
-              <a:t> Understanding these factors can help organizations better support remote workers and create healthier work environments.</a:t>
-            </a:r>
-          </a:p>
-          <a:p>
-            <a:pPr marL="0" marR="0" lvl="0" indent="0" defTabSz="914400" rtl="0" eaLnBrk="0" fontAlgn="base" latinLnBrk="0" hangingPunct="0">
-              <a:spcBef>
-                <a:spcPct val="0"/>
-              </a:spcBef>
-              <a:spcAft>
-                <a:spcPts val="600"/>
-              </a:spcAft>
-              <a:buClrTx/>
-              <a:buSzTx/>
-              <a:buNone/>
-              <a:tabLst/>
-            </a:pPr>
-            <a:endParaRPr kumimoji="0" lang="en-US" altLang="en-US" sz="2000" b="0" i="0" u="none" strike="noStrike" cap="none" normalizeH="0" baseline="0" dirty="0">
-              <a:ln>
-                <a:noFill/>
-              </a:ln>
-              <a:effectLst/>
+              <a:rPr lang="ru-RU" sz="2000" dirty="0">
+                <a:latin typeface="Apparat" panose="00000500000000000000" pitchFamily="50" charset="0"/>
+              </a:rPr>
+              <a:t> Разбирањето на овие фактори може да им помогне на организациите подобро да ги поддржат оддалечените работници и да создадат поздрави работни средини.</a:t>
+            </a:r>
+            <a:endParaRPr lang="en-US" sz="2000" dirty="0">
               <a:latin typeface="Apparat" panose="00000500000000000000" pitchFamily="50" charset="0"/>
             </a:endParaRPr>
           </a:p>
           <a:p>
-            <a:pPr marL="0" marR="0" lvl="0" indent="0" defTabSz="914400" rtl="0" eaLnBrk="0" fontAlgn="base" latinLnBrk="0" hangingPunct="0">
-              <a:spcBef>
-                <a:spcPct val="0"/>
-              </a:spcBef>
-              <a:spcAft>
-                <a:spcPts val="600"/>
-              </a:spcAft>
-              <a:buClrTx/>
-              <a:buSzTx/>
+            <a:pPr marL="0" indent="0">
               <a:buNone/>
-              <a:tabLst/>
             </a:pPr>
-            <a:r>
-              <a:rPr kumimoji="0" lang="en-US" altLang="en-US" sz="2000" b="1" i="0" u="none" strike="noStrike" cap="none" normalizeH="0" baseline="0" dirty="0">
-                <a:ln>
-                  <a:noFill/>
-                </a:ln>
+            <a:endParaRPr lang="ru-RU" sz="2000" dirty="0">
+              <a:latin typeface="Apparat" panose="00000500000000000000" pitchFamily="50" charset="0"/>
+            </a:endParaRPr>
+          </a:p>
+          <a:p>
+            <a:pPr marL="0" indent="0">
+              <a:buNone/>
+            </a:pPr>
+            <a:r>
+              <a:rPr lang="ru-RU" sz="2000" b="1" dirty="0">
                 <a:solidFill>
                   <a:srgbClr val="615DE5"/>
                 </a:solidFill>
-                <a:effectLst/>
-                <a:latin typeface="Apparat" panose="00000500000000000000" pitchFamily="50" charset="0"/>
-              </a:rPr>
-              <a:t>Focus</a:t>
-            </a:r>
-            <a:r>
-              <a:rPr kumimoji="0" lang="en-US" altLang="en-US" sz="2000" b="1" i="0" u="none" strike="noStrike" cap="none" normalizeH="0" baseline="0" dirty="0">
-                <a:ln>
-                  <a:noFill/>
-                </a:ln>
-                <a:effectLst/>
+                <a:latin typeface="Apparat" panose="00000500000000000000" pitchFamily="50" charset="0"/>
+              </a:rPr>
+              <a:t>Фокус</a:t>
+            </a:r>
+            <a:r>
+              <a:rPr lang="ru-RU" sz="2000" b="1" dirty="0">
                 <a:latin typeface="Apparat" panose="00000500000000000000" pitchFamily="50" charset="0"/>
               </a:rPr>
               <a:t>:</a:t>
             </a:r>
             <a:r>
-              <a:rPr kumimoji="0" lang="en-US" altLang="en-US" sz="2000" b="0" i="0" u="none" strike="noStrike" cap="none" normalizeH="0" baseline="0" dirty="0">
-                <a:ln>
-                  <a:noFill/>
-                </a:ln>
-                <a:effectLst/>
-                <a:latin typeface="Apparat" panose="00000500000000000000" pitchFamily="50" charset="0"/>
-              </a:rPr>
-              <a:t> International remote workers and their mental health outcomes in relation to their work environment and social factors. </a:t>
+              <a:rPr lang="ru-RU" sz="2000" dirty="0">
+                <a:latin typeface="Apparat" panose="00000500000000000000" pitchFamily="50" charset="0"/>
+              </a:rPr>
+              <a:t> Меѓународни оддалечени работници и нивните ментални здравствени исходи во однос на нивното работно опкружување и социјални фактори.</a:t>
             </a:r>
           </a:p>
         </p:txBody>
@@ -6071,22 +5952,24 @@
         </p:nvSpPr>
         <p:spPr>
           <a:xfrm>
-            <a:off x="465139" y="483331"/>
-            <a:ext cx="10515600" cy="1325563"/>
+            <a:off x="236539" y="421981"/>
+            <a:ext cx="5966868" cy="1325563"/>
           </a:xfrm>
         </p:spPr>
         <p:txBody>
-          <a:bodyPr/>
+          <a:bodyPr>
+            <a:normAutofit/>
+          </a:bodyPr>
           <a:lstStyle/>
           <a:p>
             <a:r>
-              <a:rPr lang="en-US" dirty="0">
+              <a:rPr lang="mk-MK" sz="4000" b="1" dirty="0">
                 <a:solidFill>
                   <a:srgbClr val="48D24D"/>
                 </a:solidFill>
-                <a:latin typeface="Apparat Heavy" panose="00000A00000000000000" pitchFamily="50" charset="0"/>
-              </a:rPr>
-              <a:t>Dataset Overview</a:t>
+                <a:latin typeface="Apparat" panose="00000500000000000000" pitchFamily="50" charset="0"/>
+              </a:rPr>
+              <a:t>Податочниот Сет</a:t>
             </a:r>
           </a:p>
         </p:txBody>
@@ -6114,8 +5997,8 @@
         </p:blipFill>
         <p:spPr>
           <a:xfrm>
-            <a:off x="465138" y="2088122"/>
-            <a:ext cx="5618447" cy="3633218"/>
+            <a:off x="269536" y="2088122"/>
+            <a:ext cx="5933871" cy="3837190"/>
           </a:xfrm>
         </p:spPr>
       </p:pic>
@@ -6273,8 +6156,8 @@
         </p:nvSpPr>
         <p:spPr bwMode="auto">
           <a:xfrm>
-            <a:off x="522809" y="1378007"/>
-            <a:ext cx="4883277" cy="861774"/>
+            <a:off x="236539" y="1359006"/>
+            <a:ext cx="5985777" cy="584775"/>
           </a:xfrm>
           <a:prstGeom prst="rect">
             <a:avLst/>
@@ -6337,97 +6220,59 @@
               <a:tabLst/>
             </a:pPr>
             <a:r>
-              <a:rPr kumimoji="0" lang="en-US" altLang="en-US" sz="1600" i="0" u="none" strike="noStrike" cap="none" normalizeH="0" baseline="0" dirty="0">
-                <a:ln>
-                  <a:noFill/>
-                </a:ln>
+              <a:rPr lang="ru-RU" sz="1600" dirty="0">
                 <a:solidFill>
                   <a:srgbClr val="48D24D"/>
                 </a:solidFill>
-                <a:effectLst/>
-                <a:latin typeface="Apparat" panose="00000500000000000000" pitchFamily="50" charset="0"/>
-              </a:rPr>
-              <a:t>data from </a:t>
-            </a:r>
-            <a:r>
-              <a:rPr kumimoji="0" lang="en-US" altLang="en-US" sz="1600" b="1" i="0" u="none" strike="noStrike" cap="none" normalizeH="0" baseline="0" dirty="0">
-                <a:ln>
-                  <a:noFill/>
-                </a:ln>
+                <a:latin typeface="Apparat" panose="00000500000000000000" pitchFamily="50" charset="0"/>
+              </a:rPr>
+              <a:t>Податоци од </a:t>
+            </a:r>
+            <a:r>
+              <a:rPr lang="ru-RU" sz="1600" b="1" dirty="0">
                 <a:solidFill>
                   <a:srgbClr val="48D24D"/>
                 </a:solidFill>
-                <a:effectLst/>
-                <a:latin typeface="Apparat" panose="00000500000000000000" pitchFamily="50" charset="0"/>
-              </a:rPr>
-              <a:t>5,000 remote employees </a:t>
-            </a:r>
-            <a:r>
-              <a:rPr kumimoji="0" lang="en-US" altLang="en-US" sz="1600" i="0" u="none" strike="noStrike" cap="none" normalizeH="0" baseline="0" dirty="0">
-                <a:ln>
-                  <a:noFill/>
-                </a:ln>
+                <a:latin typeface="Apparat" panose="00000500000000000000" pitchFamily="50" charset="0"/>
+              </a:rPr>
+              <a:t>5.000 оддалечени вработени</a:t>
+            </a:r>
+            <a:r>
+              <a:rPr lang="ru-RU" sz="1600" dirty="0">
                 <a:solidFill>
                   <a:srgbClr val="48D24D"/>
                 </a:solidFill>
-                <a:effectLst/>
-                <a:latin typeface="Apparat" panose="00000500000000000000" pitchFamily="50" charset="0"/>
-              </a:rPr>
-              <a:t>worldwide &amp; survey data from </a:t>
-            </a:r>
-            <a:r>
-              <a:rPr kumimoji="0" lang="en-US" altLang="en-US" sz="1600" b="1" i="0" u="none" strike="noStrike" cap="none" normalizeH="0" baseline="0" dirty="0">
-                <a:ln>
-                  <a:noFill/>
-                </a:ln>
+                <a:latin typeface="Apparat" panose="00000500000000000000" pitchFamily="50" charset="0"/>
+              </a:rPr>
+              <a:t> ширум светот и податоци од анкети од </a:t>
+            </a:r>
+            <a:r>
+              <a:rPr lang="ru-RU" sz="1600" b="1" dirty="0">
                 <a:solidFill>
                   <a:srgbClr val="48D24D"/>
                 </a:solidFill>
-                <a:effectLst/>
-                <a:latin typeface="Apparat" panose="00000500000000000000" pitchFamily="50" charset="0"/>
-              </a:rPr>
-              <a:t>100</a:t>
-            </a:r>
-            <a:r>
-              <a:rPr kumimoji="0" lang="en-US" altLang="en-US" sz="1600" i="0" u="none" strike="noStrike" cap="none" normalizeH="0" baseline="0" dirty="0">
-                <a:ln>
-                  <a:noFill/>
-                </a:ln>
+                <a:latin typeface="Apparat" panose="00000500000000000000" pitchFamily="50" charset="0"/>
+              </a:rPr>
+              <a:t>100 оддалечени вработени</a:t>
+            </a:r>
+            <a:r>
+              <a:rPr lang="ru-RU" sz="1600" dirty="0">
                 <a:solidFill>
                   <a:srgbClr val="48D24D"/>
                 </a:solidFill>
-                <a:effectLst/>
-                <a:latin typeface="Apparat" panose="00000500000000000000" pitchFamily="50" charset="0"/>
-              </a:rPr>
-              <a:t> remote employees.</a:t>
-            </a:r>
-          </a:p>
-          <a:p>
-            <a:pPr marL="0" marR="0" lvl="0" indent="0" algn="l" defTabSz="914400" rtl="0" eaLnBrk="0" fontAlgn="base" latinLnBrk="0" hangingPunct="0">
-              <a:lnSpc>
-                <a:spcPct val="100000"/>
-              </a:lnSpc>
-              <a:spcBef>
-                <a:spcPct val="0"/>
-              </a:spcBef>
-              <a:spcAft>
-                <a:spcPct val="0"/>
-              </a:spcAft>
-              <a:buClrTx/>
-              <a:buSzTx/>
-              <a:buFontTx/>
-              <a:buChar char="•"/>
-              <a:tabLst/>
-            </a:pPr>
+                <a:latin typeface="Apparat" panose="00000500000000000000" pitchFamily="50" charset="0"/>
+              </a:rPr>
+              <a:t>.</a:t>
+            </a:r>
             <a:endParaRPr kumimoji="0" lang="en-US" altLang="en-US" sz="1800" b="0" i="0" u="none" strike="noStrike" cap="none" normalizeH="0" baseline="0" dirty="0">
               <a:ln>
                 <a:noFill/>
               </a:ln>
               <a:solidFill>
-                <a:schemeClr val="tx1"/>
+                <a:srgbClr val="48D24D"/>
               </a:solidFill>
               <a:effectLst/>
-              <a:latin typeface="Arial" panose="020B0604020202020204" pitchFamily="34" charset="0"/>
+              <a:latin typeface="Apparat" panose="00000500000000000000" pitchFamily="50" charset="0"/>
             </a:endParaRPr>
           </a:p>
         </p:txBody>
@@ -6448,8 +6293,8 @@
         </p:nvSpPr>
         <p:spPr bwMode="auto">
           <a:xfrm>
-            <a:off x="6617346" y="836280"/>
-            <a:ext cx="5179623" cy="1323439"/>
+            <a:off x="6698894" y="574329"/>
+            <a:ext cx="5256567" cy="1508105"/>
           </a:xfrm>
           <a:prstGeom prst="rect">
             <a:avLst/>
@@ -6497,47 +6342,56 @@
           </a:bodyPr>
           <a:lstStyle/>
           <a:p>
-            <a:r>
-              <a:rPr lang="en-US" sz="2000" b="1" dirty="0">
-                <a:solidFill>
-                  <a:schemeClr val="bg1"/>
-                </a:solidFill>
-                <a:latin typeface="Apparat" panose="00000500000000000000" pitchFamily="50" charset="0"/>
-              </a:rPr>
-              <a:t>Data Preprocessing</a:t>
-            </a:r>
-          </a:p>
-          <a:p>
-            <a:r>
-              <a:rPr lang="en-US" sz="2000" dirty="0">
-                <a:solidFill>
-                  <a:schemeClr val="bg1"/>
-                </a:solidFill>
-                <a:latin typeface="Apparat" panose="00000500000000000000" pitchFamily="50" charset="0"/>
-              </a:rPr>
-              <a:t>Categorical variables encoded numerically.</a:t>
-            </a:r>
-          </a:p>
-          <a:p>
-            <a:r>
-              <a:rPr lang="en-US" sz="2000" dirty="0">
-                <a:solidFill>
-                  <a:schemeClr val="bg1"/>
-                </a:solidFill>
-                <a:latin typeface="Apparat" panose="00000500000000000000" pitchFamily="50" charset="0"/>
-              </a:rPr>
-              <a:t>Numerical features normalized.</a:t>
-            </a:r>
-          </a:p>
-          <a:p>
-            <a:r>
-              <a:rPr lang="en-US" sz="2000" dirty="0">
-                <a:solidFill>
-                  <a:schemeClr val="bg1"/>
-                </a:solidFill>
-                <a:latin typeface="Apparat" panose="00000500000000000000" pitchFamily="50" charset="0"/>
-              </a:rPr>
-              <a:t>Missing values imputed.</a:t>
+            <a:endParaRPr lang="ru-RU" sz="2000" dirty="0"/>
+          </a:p>
+          <a:p>
+            <a:r>
+              <a:rPr lang="ru-RU" sz="2400" b="1" dirty="0">
+                <a:solidFill>
+                  <a:schemeClr val="bg1"/>
+                </a:solidFill>
+                <a:latin typeface="Apparat" panose="00000500000000000000" pitchFamily="50" charset="0"/>
+              </a:rPr>
+              <a:t>Предобработка на податоците</a:t>
+            </a:r>
+            <a:endParaRPr lang="ru-RU" sz="2400" dirty="0">
+              <a:solidFill>
+                <a:schemeClr val="bg1"/>
+              </a:solidFill>
+              <a:latin typeface="Apparat" panose="00000500000000000000" pitchFamily="50" charset="0"/>
+            </a:endParaRPr>
+          </a:p>
+          <a:p>
+            <a:r>
+              <a:rPr lang="ru-RU" sz="1600" dirty="0">
+                <a:solidFill>
+                  <a:schemeClr val="bg1"/>
+                </a:solidFill>
+                <a:latin typeface="Apparat" panose="00000500000000000000" pitchFamily="50" charset="0"/>
+              </a:rPr>
+              <a:t>Категориските променливи се кодирани нумерички.</a:t>
+            </a:r>
+          </a:p>
+          <a:p>
+            <a:r>
+              <a:rPr lang="ru-RU" sz="1600" dirty="0">
+                <a:solidFill>
+                  <a:schemeClr val="bg1"/>
+                </a:solidFill>
+                <a:latin typeface="Apparat" panose="00000500000000000000" pitchFamily="50" charset="0"/>
+              </a:rPr>
+              <a:t>Нумеричките карактеристики се нормализирани.</a:t>
+            </a:r>
+          </a:p>
+          <a:p>
+            <a:r>
+              <a:rPr lang="ru-RU" sz="1600" dirty="0">
+                <a:solidFill>
+                  <a:schemeClr val="bg1"/>
+                </a:solidFill>
+                <a:latin typeface="Apparat" panose="00000500000000000000" pitchFamily="50" charset="0"/>
+              </a:rPr>
+              <a:t>Недостасувачките вредности се пополнети.</a:t>
             </a:r>
           </a:p>
         </p:txBody>
@@ -6695,7 +6549,7 @@
         </p:nvSpPr>
         <p:spPr>
           <a:xfrm>
-            <a:off x="235186" y="550451"/>
+            <a:off x="299193" y="436342"/>
             <a:ext cx="7345219" cy="2358457"/>
           </a:xfrm>
         </p:spPr>
@@ -6706,7 +6560,7 @@
           <a:lstStyle/>
           <a:p>
             <a:br>
-              <a:rPr lang="en-US" sz="1800" dirty="0">
+              <a:rPr lang="en-US" sz="1200" dirty="0">
                 <a:solidFill>
                   <a:schemeClr val="bg1"/>
                 </a:solidFill>
@@ -6714,25 +6568,25 @@
               </a:rPr>
             </a:br>
             <a:r>
-              <a:rPr lang="en-US" sz="1800" b="1" dirty="0">
-                <a:solidFill>
-                  <a:schemeClr val="bg1"/>
-                </a:solidFill>
-                <a:latin typeface="Apparat" panose="00000500000000000000" pitchFamily="50" charset="0"/>
-              </a:rPr>
-              <a:t>Work-from-home experience</a:t>
-            </a:r>
-            <a:r>
-              <a:rPr lang="en-US" sz="1800" dirty="0">
-                <a:solidFill>
-                  <a:schemeClr val="bg1"/>
-                </a:solidFill>
-                <a:latin typeface="Apparat" panose="00000500000000000000" pitchFamily="50" charset="0"/>
-              </a:rPr>
-              <a:t>: 40% positive, 60% negative.</a:t>
+              <a:rPr lang="ru-RU" sz="1200" b="1" dirty="0">
+                <a:solidFill>
+                  <a:schemeClr val="bg1"/>
+                </a:solidFill>
+                <a:latin typeface="Apparat" panose="00000500000000000000" pitchFamily="50" charset="0"/>
+              </a:rPr>
+              <a:t>Искуство со работа од дома:</a:t>
+            </a:r>
+            <a:r>
+              <a:rPr lang="ru-RU" sz="1200" dirty="0">
+                <a:solidFill>
+                  <a:schemeClr val="bg1"/>
+                </a:solidFill>
+                <a:latin typeface="Apparat" panose="00000500000000000000" pitchFamily="50" charset="0"/>
+              </a:rPr>
+              <a:t> 40% позитивно, 60% негативно.</a:t>
             </a:r>
             <a:br>
-              <a:rPr lang="en-US" sz="1800" dirty="0">
+              <a:rPr lang="ru-RU" sz="1200" dirty="0">
                 <a:solidFill>
                   <a:schemeClr val="bg1"/>
                 </a:solidFill>
@@ -6740,25 +6594,25 @@
               </a:rPr>
             </a:br>
             <a:r>
-              <a:rPr lang="en-US" sz="1800" b="1" dirty="0">
-                <a:solidFill>
-                  <a:schemeClr val="bg1"/>
-                </a:solidFill>
-                <a:latin typeface="Apparat" panose="00000500000000000000" pitchFamily="50" charset="0"/>
-              </a:rPr>
-              <a:t>Productivity</a:t>
-            </a:r>
-            <a:r>
-              <a:rPr lang="en-US" sz="1800" dirty="0">
-                <a:solidFill>
-                  <a:schemeClr val="bg1"/>
-                </a:solidFill>
-                <a:latin typeface="Apparat" panose="00000500000000000000" pitchFamily="50" charset="0"/>
-              </a:rPr>
-              <a:t>: 70% felt more productive at home.</a:t>
+              <a:rPr lang="ru-RU" sz="1200" b="1" dirty="0">
+                <a:solidFill>
+                  <a:schemeClr val="bg1"/>
+                </a:solidFill>
+                <a:latin typeface="Apparat" panose="00000500000000000000" pitchFamily="50" charset="0"/>
+              </a:rPr>
+              <a:t>Продуктивност:</a:t>
+            </a:r>
+            <a:r>
+              <a:rPr lang="ru-RU" sz="1200" dirty="0">
+                <a:solidFill>
+                  <a:schemeClr val="bg1"/>
+                </a:solidFill>
+                <a:latin typeface="Apparat" panose="00000500000000000000" pitchFamily="50" charset="0"/>
+              </a:rPr>
+              <a:t> 70% се чувствувале попродуктивни дома.</a:t>
             </a:r>
             <a:br>
-              <a:rPr lang="en-US" sz="1800" dirty="0">
+              <a:rPr lang="ru-RU" sz="1200" dirty="0">
                 <a:solidFill>
                   <a:schemeClr val="bg1"/>
                 </a:solidFill>
@@ -6766,25 +6620,16 @@
               </a:rPr>
             </a:br>
             <a:r>
-              <a:rPr lang="en-US" sz="1800" b="1" dirty="0">
-                <a:solidFill>
-                  <a:schemeClr val="bg1"/>
-                </a:solidFill>
-                <a:latin typeface="Apparat" panose="00000500000000000000" pitchFamily="50" charset="0"/>
-              </a:rPr>
-              <a:t>Social and lifestyle impacts</a:t>
-            </a:r>
-            <a:r>
-              <a:rPr lang="en-US" sz="1800" dirty="0">
-                <a:solidFill>
-                  <a:schemeClr val="bg1"/>
-                </a:solidFill>
-                <a:latin typeface="Apparat" panose="00000500000000000000" pitchFamily="50" charset="0"/>
-              </a:rPr>
-              <a:t>:</a:t>
+              <a:rPr lang="ru-RU" sz="1200" b="1" dirty="0">
+                <a:solidFill>
+                  <a:schemeClr val="bg1"/>
+                </a:solidFill>
+                <a:latin typeface="Apparat" panose="00000500000000000000" pitchFamily="50" charset="0"/>
+              </a:rPr>
+              <a:t>Социјални и животни влијанија:</a:t>
             </a:r>
             <a:br>
-              <a:rPr lang="en-US" sz="1800" dirty="0">
+              <a:rPr lang="ru-RU" sz="1200" dirty="0">
                 <a:solidFill>
                   <a:schemeClr val="bg1"/>
                 </a:solidFill>
@@ -6792,16 +6637,16 @@
               </a:rPr>
             </a:br>
             <a:r>
-              <a:rPr lang="en-US" sz="1800" dirty="0">
-                <a:solidFill>
-                  <a:schemeClr val="bg1"/>
-                </a:solidFill>
-                <a:latin typeface="Apparat" panose="00000500000000000000" pitchFamily="50" charset="0"/>
-              </a:rPr>
-              <a:t>70% reported reduced social interaction.</a:t>
+              <a:rPr lang="ru-RU" sz="1200" dirty="0">
+                <a:solidFill>
+                  <a:schemeClr val="bg1"/>
+                </a:solidFill>
+                <a:latin typeface="Apparat" panose="00000500000000000000" pitchFamily="50" charset="0"/>
+              </a:rPr>
+              <a:t>70% пријавиле намалена социјална интеракција.</a:t>
             </a:r>
             <a:br>
-              <a:rPr lang="en-US" sz="1800" dirty="0">
+              <a:rPr lang="ru-RU" sz="1200" dirty="0">
                 <a:solidFill>
                   <a:schemeClr val="bg1"/>
                 </a:solidFill>
@@ -6809,16 +6654,16 @@
               </a:rPr>
             </a:br>
             <a:r>
-              <a:rPr lang="en-US" sz="1800" dirty="0">
-                <a:solidFill>
-                  <a:schemeClr val="bg1"/>
-                </a:solidFill>
-                <a:latin typeface="Apparat" panose="00000500000000000000" pitchFamily="50" charset="0"/>
-              </a:rPr>
-              <a:t>100% appreciated flexibility of remote work.</a:t>
+              <a:rPr lang="ru-RU" sz="1200" dirty="0">
+                <a:solidFill>
+                  <a:schemeClr val="bg1"/>
+                </a:solidFill>
+                <a:latin typeface="Apparat" panose="00000500000000000000" pitchFamily="50" charset="0"/>
+              </a:rPr>
+              <a:t>100% ја ценеле флексибилноста на оддалечената работа.</a:t>
             </a:r>
             <a:br>
-              <a:rPr lang="en-US" sz="1800" dirty="0">
+              <a:rPr lang="ru-RU" sz="1200" dirty="0">
                 <a:solidFill>
                   <a:schemeClr val="bg1"/>
                 </a:solidFill>
@@ -6826,16 +6671,16 @@
               </a:rPr>
             </a:br>
             <a:r>
-              <a:rPr lang="en-US" sz="1800" dirty="0">
-                <a:solidFill>
-                  <a:schemeClr val="bg1"/>
-                </a:solidFill>
-                <a:latin typeface="Apparat" panose="00000500000000000000" pitchFamily="50" charset="0"/>
-              </a:rPr>
-              <a:t>70% felt remote work prevented going out.</a:t>
+              <a:rPr lang="ru-RU" sz="1200" dirty="0">
+                <a:solidFill>
+                  <a:schemeClr val="bg1"/>
+                </a:solidFill>
+                <a:latin typeface="Apparat" panose="00000500000000000000" pitchFamily="50" charset="0"/>
+              </a:rPr>
+              <a:t>70% сметале дека оддалечената работа ги спречува да излегуваат.</a:t>
             </a:r>
             <a:br>
-              <a:rPr lang="en-US" sz="1800" dirty="0">
+              <a:rPr lang="ru-RU" sz="1200" dirty="0">
                 <a:solidFill>
                   <a:schemeClr val="bg1"/>
                 </a:solidFill>
@@ -6843,16 +6688,16 @@
               </a:rPr>
             </a:br>
             <a:r>
-              <a:rPr lang="en-US" sz="1800" dirty="0">
-                <a:solidFill>
-                  <a:schemeClr val="bg1"/>
-                </a:solidFill>
-                <a:latin typeface="Apparat" panose="00000500000000000000" pitchFamily="50" charset="0"/>
-              </a:rPr>
-              <a:t>60% preferred office focus over remote work (40%).</a:t>
+              <a:rPr lang="ru-RU" sz="1200" dirty="0">
+                <a:solidFill>
+                  <a:schemeClr val="bg1"/>
+                </a:solidFill>
+                <a:latin typeface="Apparat" panose="00000500000000000000" pitchFamily="50" charset="0"/>
+              </a:rPr>
+              <a:t>60% ја претпочитале фокусираноста во канцеларија повеќе од оддалечената работа (40%).</a:t>
             </a:r>
             <a:br>
-              <a:rPr lang="en-US" sz="1800" dirty="0">
+              <a:rPr lang="ru-RU" sz="1200" dirty="0">
                 <a:solidFill>
                   <a:schemeClr val="bg1"/>
                 </a:solidFill>
@@ -6860,25 +6705,16 @@
               </a:rPr>
             </a:br>
             <a:r>
-              <a:rPr lang="en-US" sz="1800" b="1" dirty="0">
-                <a:solidFill>
-                  <a:schemeClr val="bg1"/>
-                </a:solidFill>
-                <a:latin typeface="Apparat" panose="00000500000000000000" pitchFamily="50" charset="0"/>
-              </a:rPr>
-              <a:t>Mental health</a:t>
-            </a:r>
-            <a:r>
-              <a:rPr lang="en-US" sz="1800" dirty="0">
-                <a:solidFill>
-                  <a:schemeClr val="bg1"/>
-                </a:solidFill>
-                <a:latin typeface="Apparat" panose="00000500000000000000" pitchFamily="50" charset="0"/>
-              </a:rPr>
-              <a:t>: 70% linked remote work to mental health issues, 30% to office work.</a:t>
+              <a:rPr lang="ru-RU" sz="1200" b="1" dirty="0">
+                <a:solidFill>
+                  <a:schemeClr val="bg1"/>
+                </a:solidFill>
+                <a:latin typeface="Apparat" panose="00000500000000000000" pitchFamily="50" charset="0"/>
+              </a:rPr>
+              <a:t>Ментално здравје:</a:t>
             </a:r>
             <a:br>
-              <a:rPr lang="en-US" sz="1800" dirty="0">
+              <a:rPr lang="ru-RU" sz="1200" dirty="0">
                 <a:solidFill>
                   <a:schemeClr val="bg1"/>
                 </a:solidFill>
@@ -6886,22 +6722,81 @@
               </a:rPr>
             </a:br>
             <a:r>
-              <a:rPr lang="en-US" sz="1800" b="1" dirty="0">
-                <a:solidFill>
-                  <a:schemeClr val="bg1"/>
-                </a:solidFill>
-                <a:latin typeface="Apparat" panose="00000500000000000000" pitchFamily="50" charset="0"/>
-              </a:rPr>
-              <a:t>Work preference</a:t>
-            </a:r>
-            <a:r>
-              <a:rPr lang="en-US" sz="1800" dirty="0">
-                <a:solidFill>
-                  <a:schemeClr val="bg1"/>
-                </a:solidFill>
-                <a:latin typeface="Apparat" panose="00000500000000000000" pitchFamily="50" charset="0"/>
-              </a:rPr>
-              <a:t>: 50% preferred hybrid, 30% office, 20% remote.</a:t>
+              <a:rPr lang="ru-RU" sz="1200" dirty="0">
+                <a:solidFill>
+                  <a:schemeClr val="bg1"/>
+                </a:solidFill>
+                <a:latin typeface="Apparat" panose="00000500000000000000" pitchFamily="50" charset="0"/>
+              </a:rPr>
+              <a:t>70% ја поврзале оддалечената работа со ментални здравствени проблеми, 30% ја поврзале канцелариската работа.</a:t>
+            </a:r>
+            <a:br>
+              <a:rPr lang="ru-RU" sz="1200" dirty="0">
+                <a:solidFill>
+                  <a:schemeClr val="bg1"/>
+                </a:solidFill>
+                <a:latin typeface="Apparat" panose="00000500000000000000" pitchFamily="50" charset="0"/>
+              </a:rPr>
+            </a:br>
+            <a:r>
+              <a:rPr lang="ru-RU" sz="1200" b="1" dirty="0">
+                <a:solidFill>
+                  <a:schemeClr val="bg1"/>
+                </a:solidFill>
+                <a:latin typeface="Apparat" panose="00000500000000000000" pitchFamily="50" charset="0"/>
+              </a:rPr>
+              <a:t>Преференции за работа:</a:t>
+            </a:r>
+            <a:br>
+              <a:rPr lang="ru-RU" sz="1200" dirty="0">
+                <a:solidFill>
+                  <a:schemeClr val="bg1"/>
+                </a:solidFill>
+                <a:latin typeface="Apparat" panose="00000500000000000000" pitchFamily="50" charset="0"/>
+              </a:rPr>
+            </a:br>
+            <a:r>
+              <a:rPr lang="ru-RU" sz="1200" dirty="0">
+                <a:solidFill>
+                  <a:schemeClr val="bg1"/>
+                </a:solidFill>
+                <a:latin typeface="Apparat" panose="00000500000000000000" pitchFamily="50" charset="0"/>
+              </a:rPr>
+              <a:t>50% претпочитале хибриден модел,</a:t>
+            </a:r>
+            <a:br>
+              <a:rPr lang="ru-RU" sz="1200" dirty="0">
+                <a:solidFill>
+                  <a:schemeClr val="bg1"/>
+                </a:solidFill>
+                <a:latin typeface="Apparat" panose="00000500000000000000" pitchFamily="50" charset="0"/>
+              </a:rPr>
+            </a:br>
+            <a:r>
+              <a:rPr lang="ru-RU" sz="1200" dirty="0">
+                <a:solidFill>
+                  <a:schemeClr val="bg1"/>
+                </a:solidFill>
+                <a:latin typeface="Apparat" panose="00000500000000000000" pitchFamily="50" charset="0"/>
+              </a:rPr>
+              <a:t>30% канцелариска работа,</a:t>
+            </a:r>
+            <a:br>
+              <a:rPr lang="ru-RU" sz="1200" dirty="0">
+                <a:solidFill>
+                  <a:schemeClr val="bg1"/>
+                </a:solidFill>
+                <a:latin typeface="Apparat" panose="00000500000000000000" pitchFamily="50" charset="0"/>
+              </a:rPr>
+            </a:br>
+            <a:r>
+              <a:rPr lang="ru-RU" sz="1200" dirty="0">
+                <a:solidFill>
+                  <a:schemeClr val="bg1"/>
+                </a:solidFill>
+                <a:latin typeface="Apparat" panose="00000500000000000000" pitchFamily="50" charset="0"/>
+              </a:rPr>
+              <a:t>20% оддалечена работа.</a:t>
             </a:r>
           </a:p>
         </p:txBody>
@@ -7058,8 +6953,8 @@
         </p:nvSpPr>
         <p:spPr>
           <a:xfrm>
-            <a:off x="6526216" y="423062"/>
-            <a:ext cx="4973283" cy="1446550"/>
+            <a:off x="7644413" y="323650"/>
+            <a:ext cx="3919094" cy="1446550"/>
           </a:xfrm>
           <a:prstGeom prst="rect">
             <a:avLst/>
@@ -7074,14 +6969,18 @@
           <a:p>
             <a:pPr algn="r"/>
             <a:r>
-              <a:rPr lang="en-US" sz="4400" b="1" dirty="0">
-                <a:solidFill>
-                  <a:schemeClr val="bg1"/>
-                </a:solidFill>
-                <a:latin typeface="Apparat" panose="00000500000000000000" pitchFamily="50" charset="0"/>
-              </a:rPr>
-              <a:t>Questionnaire Insights</a:t>
-            </a:r>
+              <a:rPr lang="mk-MK" sz="4400" b="1" dirty="0">
+                <a:solidFill>
+                  <a:schemeClr val="bg1"/>
+                </a:solidFill>
+              </a:rPr>
+              <a:t>Увид од Анкетата</a:t>
+            </a:r>
+            <a:endParaRPr lang="mk-MK" sz="4400" dirty="0">
+              <a:solidFill>
+                <a:schemeClr val="bg1"/>
+              </a:solidFill>
+            </a:endParaRPr>
           </a:p>
         </p:txBody>
       </p:sp>
@@ -7305,10 +7204,10 @@
           <a:lstStyle/>
           <a:p>
             <a:r>
-              <a:rPr lang="en-US" b="1" dirty="0">
-                <a:latin typeface="Apparat" panose="00000500000000000000" pitchFamily="50" charset="0"/>
-              </a:rPr>
-              <a:t>Machine Learning Methods</a:t>
+              <a:rPr lang="mk-MK" b="1" dirty="0">
+                <a:latin typeface="Apparat" panose="00000500000000000000" pitchFamily="50" charset="0"/>
+              </a:rPr>
+              <a:t>Методи на Машинско Учење</a:t>
             </a:r>
             <a:endParaRPr lang="en-US" b="1" dirty="0">
               <a:solidFill>
@@ -7473,8 +7372,8 @@
         </p:nvSpPr>
         <p:spPr bwMode="auto">
           <a:xfrm>
-            <a:off x="616041" y="2543762"/>
-            <a:ext cx="3688830" cy="738664"/>
+            <a:off x="616041" y="2339443"/>
+            <a:ext cx="4136069" cy="738664"/>
           </a:xfrm>
           <a:prstGeom prst="rect">
             <a:avLst/>
@@ -7523,10 +7422,16 @@
           <a:lstStyle/>
           <a:p>
             <a:r>
+              <a:rPr lang="mk-MK" sz="2400" b="1" dirty="0">
+                <a:latin typeface="Apparat" panose="00000500000000000000" pitchFamily="50" charset="0"/>
+              </a:rPr>
+              <a:t>Логистичка Регресија</a:t>
+            </a:r>
+            <a:r>
               <a:rPr lang="en-US" sz="2400" b="1" dirty="0">
                 <a:latin typeface="Apparat" panose="00000500000000000000" pitchFamily="50" charset="0"/>
               </a:rPr>
-              <a:t>Logistic Regression (LR)</a:t>
+              <a:t> (LR)</a:t>
             </a:r>
             <a:r>
               <a:rPr lang="en-US" sz="2400" dirty="0">
@@ -7581,8 +7486,8 @@
         </p:nvSpPr>
         <p:spPr bwMode="auto">
           <a:xfrm>
-            <a:off x="6712083" y="2543762"/>
-            <a:ext cx="4863832" cy="461665"/>
+            <a:off x="6712083" y="2154777"/>
+            <a:ext cx="3707264" cy="830997"/>
           </a:xfrm>
           <a:prstGeom prst="rect">
             <a:avLst/>
@@ -7622,7 +7527,7 @@
           </a:extLst>
         </p:spPr>
         <p:txBody>
-          <a:bodyPr vert="horz" wrap="none" lIns="91440" tIns="45720" rIns="91440" bIns="45720" numCol="1" anchor="ctr" anchorCtr="0" compatLnSpc="1">
+          <a:bodyPr vert="horz" wrap="square" lIns="91440" tIns="45720" rIns="91440" bIns="45720" numCol="1" anchor="ctr" anchorCtr="0" compatLnSpc="1">
             <a:prstTxWarp prst="textNoShape">
               <a:avLst/>
             </a:prstTxWarp>
@@ -7631,10 +7536,16 @@
           <a:lstStyle/>
           <a:p>
             <a:r>
+              <a:rPr lang="mk-MK" sz="2400" b="1" dirty="0">
+                <a:latin typeface="Apparat" panose="00000500000000000000" pitchFamily="50" charset="0"/>
+              </a:rPr>
+              <a:t>Поддржани Векторски Машини</a:t>
+            </a:r>
+            <a:r>
               <a:rPr lang="en-US" sz="2400" b="1" dirty="0">
                 <a:latin typeface="Apparat" panose="00000500000000000000" pitchFamily="50" charset="0"/>
               </a:rPr>
-              <a:t>Support Vector Machines (SVM)</a:t>
+              <a:t>(SVM)</a:t>
             </a:r>
             <a:r>
               <a:rPr lang="en-US" sz="2400" dirty="0">
@@ -7661,8 +7572,8 @@
         </p:nvSpPr>
         <p:spPr bwMode="auto">
           <a:xfrm>
-            <a:off x="616041" y="3143926"/>
-            <a:ext cx="4366890" cy="2862322"/>
+            <a:off x="616040" y="3078107"/>
+            <a:ext cx="4860735" cy="3139321"/>
           </a:xfrm>
           <a:prstGeom prst="rect">
             <a:avLst/>
@@ -7725,7 +7636,7 @@
               <a:tabLst/>
             </a:pPr>
             <a:r>
-              <a:rPr kumimoji="0" lang="en-US" altLang="en-US" sz="1800" b="0" i="0" u="none" strike="noStrike" cap="none" normalizeH="0" baseline="0" dirty="0">
+              <a:rPr kumimoji="0" lang="mk-MK" altLang="en-US" sz="1800" b="0" i="0" u="none" strike="noStrike" cap="none" normalizeH="0" baseline="0" dirty="0">
                 <a:ln>
                   <a:noFill/>
                 </a:ln>
@@ -7735,10 +7646,10 @@
                 <a:effectLst/>
                 <a:latin typeface="Apparat" panose="00000500000000000000" pitchFamily="50" charset="0"/>
               </a:rPr>
-              <a:t>Used to </a:t>
-            </a:r>
-            <a:r>
-              <a:rPr kumimoji="0" lang="en-US" altLang="en-US" sz="1800" b="1" i="0" u="none" strike="noStrike" cap="none" normalizeH="0" baseline="0" dirty="0">
+              <a:t>Се користи за </a:t>
+            </a:r>
+            <a:r>
+              <a:rPr kumimoji="0" lang="mk-MK" altLang="en-US" sz="1800" b="0" i="0" u="none" strike="noStrike" cap="none" normalizeH="0" baseline="0" dirty="0">
                 <a:ln>
                   <a:noFill/>
                 </a:ln>
@@ -7748,10 +7659,10 @@
                 <a:effectLst/>
                 <a:latin typeface="Apparat" panose="00000500000000000000" pitchFamily="50" charset="0"/>
               </a:rPr>
-              <a:t>predict</a:t>
-            </a:r>
-            <a:r>
-              <a:rPr kumimoji="0" lang="en-US" altLang="en-US" sz="1800" b="0" i="0" u="none" strike="noStrike" cap="none" normalizeH="0" baseline="0" dirty="0">
+              <a:t>предвидување</a:t>
+            </a:r>
+            <a:r>
+              <a:rPr kumimoji="0" lang="mk-MK" altLang="en-US" sz="1800" b="0" i="0" u="none" strike="noStrike" cap="none" normalizeH="0" baseline="0" dirty="0">
                 <a:ln>
                   <a:noFill/>
                 </a:ln>
@@ -7761,8 +7672,18 @@
                 <a:effectLst/>
                 <a:latin typeface="Apparat" panose="00000500000000000000" pitchFamily="50" charset="0"/>
               </a:rPr>
-              <a:t> mental health conditions (e.g., anxiety, depression).</a:t>
-            </a:r>
+              <a:t> на менталните здравствени состојби (на пр. Анксиозност, депресија)</a:t>
+            </a:r>
+            <a:endParaRPr kumimoji="0" lang="en-US" altLang="en-US" sz="1800" b="0" i="0" u="none" strike="noStrike" cap="none" normalizeH="0" baseline="0" dirty="0">
+              <a:ln>
+                <a:noFill/>
+              </a:ln>
+              <a:solidFill>
+                <a:schemeClr val="tx1"/>
+              </a:solidFill>
+              <a:effectLst/>
+              <a:latin typeface="Apparat" panose="00000500000000000000" pitchFamily="50" charset="0"/>
+            </a:endParaRPr>
           </a:p>
           <a:p>
             <a:pPr marL="0" marR="0" lvl="0" indent="0" algn="l" defTabSz="914400" rtl="0" eaLnBrk="0" fontAlgn="base" latinLnBrk="0" hangingPunct="0">
@@ -7779,7 +7700,7 @@
               <a:buSzTx/>
               <a:tabLst/>
             </a:pPr>
-            <a:endParaRPr kumimoji="0" lang="en-US" altLang="en-US" sz="1800" b="0" i="0" u="none" strike="noStrike" cap="none" normalizeH="0" baseline="0" dirty="0">
+            <a:endParaRPr kumimoji="0" lang="mk-MK" altLang="en-US" sz="1800" b="0" i="0" u="none" strike="noStrike" cap="none" normalizeH="0" baseline="0" dirty="0">
               <a:ln>
                 <a:noFill/>
               </a:ln>
@@ -7806,17 +7727,10 @@
               <a:tabLst/>
             </a:pPr>
             <a:r>
-              <a:rPr kumimoji="0" lang="en-US" altLang="en-US" sz="1800" b="0" i="0" u="none" strike="noStrike" cap="none" normalizeH="0" baseline="0" dirty="0">
-                <a:ln>
-                  <a:noFill/>
-                </a:ln>
-                <a:solidFill>
-                  <a:schemeClr val="tx1"/>
-                </a:solidFill>
-                <a:effectLst/>
-                <a:latin typeface="Apparat" panose="00000500000000000000" pitchFamily="50" charset="0"/>
-              </a:rPr>
-              <a:t>Estimates probability of mental health outcomes based on stress, isolation, and satisfaction.</a:t>
+              <a:rPr lang="mk-MK" altLang="en-US" dirty="0">
+                <a:latin typeface="Apparat" panose="00000500000000000000" pitchFamily="50" charset="0"/>
+              </a:rPr>
+              <a:t>Го проценува веројатното појавување на ментални здравствени исходи врз основа на стрес, изолација и задоволство.</a:t>
             </a:r>
           </a:p>
           <a:p>
@@ -7834,7 +7748,7 @@
               <a:buSzTx/>
               <a:tabLst/>
             </a:pPr>
-            <a:endParaRPr kumimoji="0" lang="en-US" altLang="en-US" sz="1800" b="0" i="0" u="none" strike="noStrike" cap="none" normalizeH="0" baseline="0" dirty="0">
+            <a:endParaRPr kumimoji="0" lang="mk-MK" altLang="en-US" sz="1800" b="0" i="0" u="none" strike="noStrike" cap="none" normalizeH="0" baseline="0" dirty="0">
               <a:ln>
                 <a:noFill/>
               </a:ln>
@@ -7861,36 +7775,11 @@
               <a:tabLst/>
             </a:pPr>
             <a:r>
-              <a:rPr kumimoji="0" lang="en-US" altLang="en-US" sz="1800" b="0" i="0" u="none" strike="noStrike" cap="none" normalizeH="0" baseline="0" dirty="0">
-                <a:ln>
-                  <a:noFill/>
-                </a:ln>
-                <a:solidFill>
-                  <a:schemeClr val="tx1"/>
-                </a:solidFill>
-                <a:effectLst/>
-                <a:latin typeface="Apparat" panose="00000500000000000000" pitchFamily="50" charset="0"/>
-              </a:rPr>
-              <a:t>Provides insights into significant predictors for mental health risks.</a:t>
-            </a:r>
-          </a:p>
-          <a:p>
-            <a:pPr marL="0" marR="0" lvl="0" indent="0" algn="l" defTabSz="914400" rtl="0" eaLnBrk="0" fontAlgn="base" latinLnBrk="0" hangingPunct="0">
-              <a:lnSpc>
-                <a:spcPct val="100000"/>
-              </a:lnSpc>
-              <a:spcBef>
-                <a:spcPct val="0"/>
-              </a:spcBef>
-              <a:spcAft>
-                <a:spcPct val="0"/>
-              </a:spcAft>
-              <a:buClrTx/>
-              <a:buSzTx/>
-              <a:buFontTx/>
-              <a:buChar char="•"/>
-              <a:tabLst/>
-            </a:pPr>
+              <a:rPr lang="mk-MK" altLang="en-US" dirty="0">
+                <a:latin typeface="Apparat" panose="00000500000000000000" pitchFamily="50" charset="0"/>
+              </a:rPr>
+              <a:t>Обезбедува увид во значајните предиктори за ризици поврзани со менталното здравје.</a:t>
+            </a:r>
             <a:endParaRPr kumimoji="0" lang="en-US" altLang="en-US" sz="1800" b="0" i="0" u="none" strike="noStrike" cap="none" normalizeH="0" baseline="0" dirty="0">
               <a:ln>
                 <a:noFill/>
@@ -7918,8 +7807,8 @@
         </p:nvSpPr>
         <p:spPr>
           <a:xfrm>
-            <a:off x="6721431" y="3078107"/>
-            <a:ext cx="3987800" cy="2585323"/>
+            <a:off x="6721430" y="3191502"/>
+            <a:ext cx="5105611" cy="2308324"/>
           </a:xfrm>
           <a:prstGeom prst="rect">
             <a:avLst/>
@@ -7947,6 +7836,69 @@
               <a:tabLst/>
             </a:pPr>
             <a:r>
+              <a:rPr kumimoji="0" lang="mk-MK" altLang="en-US" sz="1800" b="0" i="0" u="none" strike="noStrike" cap="none" normalizeH="0" baseline="0" dirty="0">
+                <a:ln>
+                  <a:noFill/>
+                </a:ln>
+                <a:solidFill>
+                  <a:schemeClr val="tx1"/>
+                </a:solidFill>
+                <a:effectLst/>
+                <a:latin typeface="Apparat" panose="00000500000000000000" pitchFamily="50" charset="0"/>
+              </a:rPr>
+              <a:t>Се користи за </a:t>
+            </a:r>
+            <a:r>
+              <a:rPr kumimoji="0" lang="mk-MK" altLang="en-US" sz="1800" b="0" i="0" u="none" strike="noStrike" cap="none" normalizeH="0" baseline="0" dirty="0">
+                <a:ln>
+                  <a:noFill/>
+                </a:ln>
+                <a:solidFill>
+                  <a:schemeClr val="bg1"/>
+                </a:solidFill>
+                <a:effectLst/>
+                <a:latin typeface="Apparat" panose="00000500000000000000" pitchFamily="50" charset="0"/>
+              </a:rPr>
+              <a:t>класификација</a:t>
+            </a:r>
+            <a:br>
+              <a:rPr kumimoji="0" lang="mk-MK" altLang="en-US" sz="1800" b="0" i="0" u="none" strike="noStrike" cap="none" normalizeH="0" baseline="0" dirty="0">
+                <a:ln>
+                  <a:noFill/>
+                </a:ln>
+                <a:solidFill>
+                  <a:schemeClr val="tx1"/>
+                </a:solidFill>
+                <a:effectLst/>
+                <a:latin typeface="Apparat" panose="00000500000000000000" pitchFamily="50" charset="0"/>
+              </a:rPr>
+            </a:br>
+            <a:br>
+              <a:rPr kumimoji="0" lang="mk-MK" altLang="en-US" sz="1800" b="0" i="0" u="none" strike="noStrike" cap="none" normalizeH="0" baseline="0" dirty="0">
+                <a:ln>
+                  <a:noFill/>
+                </a:ln>
+                <a:solidFill>
+                  <a:schemeClr val="tx1"/>
+                </a:solidFill>
+                <a:effectLst/>
+                <a:latin typeface="Apparat" panose="00000500000000000000" pitchFamily="50" charset="0"/>
+              </a:rPr>
+            </a:br>
+            <a:r>
+              <a:rPr kumimoji="0" lang="mk-MK" altLang="en-US" sz="1800" b="0" i="0" u="none" strike="noStrike" cap="none" normalizeH="0" baseline="0" dirty="0">
+                <a:ln>
+                  <a:noFill/>
+                </a:ln>
+                <a:solidFill>
+                  <a:schemeClr val="tx1"/>
+                </a:solidFill>
+                <a:effectLst/>
+                <a:latin typeface="Apparat" panose="00000500000000000000" pitchFamily="50" charset="0"/>
+              </a:rPr>
+              <a:t>Раководи со нелинеарни односи користејќи </a:t>
+            </a:r>
+            <a:r>
               <a:rPr kumimoji="0" lang="en-US" altLang="en-US" sz="1800" b="0" i="0" u="none" strike="noStrike" cap="none" normalizeH="0" baseline="0" dirty="0">
                 <a:ln>
                   <a:noFill/>
@@ -7957,33 +7909,20 @@
                 <a:effectLst/>
                 <a:latin typeface="Apparat" panose="00000500000000000000" pitchFamily="50" charset="0"/>
               </a:rPr>
-              <a:t>Used for </a:t>
-            </a:r>
-            <a:r>
-              <a:rPr kumimoji="0" lang="en-US" altLang="en-US" sz="1800" b="0" i="0" u="none" strike="noStrike" cap="none" normalizeH="0" baseline="0" dirty="0">
+              <a:t>kernel </a:t>
+            </a:r>
+            <a:r>
+              <a:rPr kumimoji="0" lang="mk-MK" altLang="en-US" sz="1800" b="0" i="0" u="none" strike="noStrike" cap="none" normalizeH="0" baseline="0" dirty="0">
                 <a:ln>
                   <a:noFill/>
                 </a:ln>
                 <a:solidFill>
-                  <a:schemeClr val="bg1"/>
+                  <a:schemeClr val="tx1"/>
                 </a:solidFill>
                 <a:effectLst/>
                 <a:latin typeface="Apparat" panose="00000500000000000000" pitchFamily="50" charset="0"/>
               </a:rPr>
-              <a:t>classification</a:t>
-            </a:r>
-            <a:r>
-              <a:rPr kumimoji="0" lang="en-US" altLang="en-US" sz="1800" b="0" i="0" u="none" strike="noStrike" cap="none" normalizeH="0" baseline="0" dirty="0">
-                <a:ln>
-                  <a:noFill/>
-                </a:ln>
-                <a:solidFill>
-                  <a:schemeClr val="tx1"/>
-                </a:solidFill>
-                <a:effectLst/>
-                <a:latin typeface="Apparat" panose="00000500000000000000" pitchFamily="50" charset="0"/>
-              </a:rPr>
-              <a:t> (mental health condition vs. no condition).</a:t>
+              <a:t>трикови</a:t>
             </a:r>
           </a:p>
           <a:p>
@@ -8001,14 +7940,7 @@
               <a:buSzTx/>
               <a:tabLst/>
             </a:pPr>
-            <a:endParaRPr kumimoji="0" lang="en-US" altLang="en-US" sz="1800" b="0" i="0" u="none" strike="noStrike" cap="none" normalizeH="0" baseline="0" dirty="0">
-              <a:ln>
-                <a:noFill/>
-              </a:ln>
-              <a:solidFill>
-                <a:schemeClr val="tx1"/>
-              </a:solidFill>
-              <a:effectLst/>
+            <a:endParaRPr lang="mk-MK" altLang="en-US" dirty="0">
               <a:latin typeface="Apparat" panose="00000500000000000000" pitchFamily="50" charset="0"/>
             </a:endParaRPr>
           </a:p>
@@ -8028,86 +7960,93 @@
               <a:tabLst/>
             </a:pPr>
             <a:r>
+              <a:rPr kumimoji="0" lang="mk-MK" altLang="en-US" sz="1800" b="0" i="0" u="none" strike="noStrike" cap="none" normalizeH="0" baseline="0" dirty="0">
+                <a:ln>
+                  <a:noFill/>
+                </a:ln>
+                <a:solidFill>
+                  <a:schemeClr val="tx1"/>
+                </a:solidFill>
+                <a:effectLst/>
+                <a:latin typeface="Apparat" panose="00000500000000000000" pitchFamily="50" charset="0"/>
+              </a:rPr>
+              <a:t>Применет е </a:t>
+            </a:r>
+            <a:r>
               <a:rPr kumimoji="0" lang="en-US" altLang="en-US" sz="1800" b="0" i="0" u="none" strike="noStrike" cap="none" normalizeH="0" baseline="0" dirty="0">
                 <a:ln>
                   <a:noFill/>
                 </a:ln>
                 <a:solidFill>
+                  <a:schemeClr val="bg1"/>
+                </a:solidFill>
+                <a:effectLst/>
+                <a:latin typeface="Apparat" panose="00000500000000000000" pitchFamily="50" charset="0"/>
+              </a:rPr>
+              <a:t>SMOTE</a:t>
+            </a:r>
+            <a:r>
+              <a:rPr kumimoji="0" lang="en-US" altLang="en-US" sz="1800" b="0" i="0" u="none" strike="noStrike" cap="none" normalizeH="0" baseline="0" dirty="0">
+                <a:ln>
+                  <a:noFill/>
+                </a:ln>
+                <a:solidFill>
                   <a:schemeClr val="tx1"/>
                 </a:solidFill>
                 <a:effectLst/>
                 <a:latin typeface="Apparat" panose="00000500000000000000" pitchFamily="50" charset="0"/>
               </a:rPr>
-              <a:t>Handles non-linear relationships using kernel tricks.</a:t>
-            </a:r>
-          </a:p>
-          <a:p>
-            <a:pPr marL="0" marR="0" lvl="0" indent="0" algn="l" defTabSz="914400" rtl="0" eaLnBrk="0" fontAlgn="base" latinLnBrk="0" hangingPunct="0">
-              <a:lnSpc>
-                <a:spcPct val="100000"/>
-              </a:lnSpc>
-              <a:spcBef>
-                <a:spcPct val="0"/>
-              </a:spcBef>
-              <a:spcAft>
-                <a:spcPct val="0"/>
-              </a:spcAft>
-              <a:buClrTx/>
-              <a:buSzTx/>
-              <a:tabLst/>
-            </a:pPr>
-            <a:endParaRPr kumimoji="0" lang="en-US" altLang="en-US" sz="1800" b="1" i="0" u="none" strike="noStrike" cap="none" normalizeH="0" baseline="0" dirty="0">
+              <a:t> </a:t>
+            </a:r>
+            <a:r>
+              <a:rPr kumimoji="0" lang="mk-MK" altLang="en-US" sz="1800" b="0" i="0" u="none" strike="noStrike" cap="none" normalizeH="0" baseline="0" dirty="0">
+                <a:ln>
+                  <a:noFill/>
+                </a:ln>
+                <a:solidFill>
+                  <a:schemeClr val="tx1"/>
+                </a:solidFill>
+                <a:effectLst/>
+                <a:latin typeface="Apparat" panose="00000500000000000000" pitchFamily="50" charset="0"/>
+              </a:rPr>
+              <a:t>за справување со нерамнотежата на класите преку </a:t>
+            </a:r>
+            <a:r>
+              <a:rPr kumimoji="0" lang="en-US" altLang="en-US" sz="1800" b="0" i="0" u="none" strike="noStrike" cap="none" normalizeH="0" baseline="0" dirty="0">
+                <a:ln>
+                  <a:noFill/>
+                </a:ln>
+                <a:solidFill>
+                  <a:schemeClr val="tx1"/>
+                </a:solidFill>
+                <a:effectLst/>
+                <a:latin typeface="Apparat" panose="00000500000000000000" pitchFamily="50" charset="0"/>
+              </a:rPr>
+              <a:t>oversampling</a:t>
+            </a:r>
+            <a:r>
+              <a:rPr kumimoji="0" lang="mk-MK" altLang="en-US" sz="1800" b="0" i="0" u="none" strike="noStrike" cap="none" normalizeH="0" baseline="0" dirty="0">
+                <a:ln>
+                  <a:noFill/>
+                </a:ln>
+                <a:solidFill>
+                  <a:schemeClr val="tx1"/>
+                </a:solidFill>
+                <a:effectLst/>
+                <a:latin typeface="Apparat" panose="00000500000000000000" pitchFamily="50" charset="0"/>
+              </a:rPr>
+              <a:t> на малцинската класа</a:t>
+            </a:r>
+            <a:endParaRPr kumimoji="0" lang="en-US" altLang="en-US" sz="1800" b="0" i="0" u="none" strike="noStrike" cap="none" normalizeH="0" baseline="0" dirty="0">
               <a:ln>
                 <a:noFill/>
               </a:ln>
               <a:solidFill>
-                <a:schemeClr val="bg1"/>
+                <a:schemeClr val="tx1"/>
               </a:solidFill>
               <a:effectLst/>
               <a:latin typeface="Apparat" panose="00000500000000000000" pitchFamily="50" charset="0"/>
             </a:endParaRPr>
-          </a:p>
-          <a:p>
-            <a:pPr marL="0" marR="0" lvl="0" indent="0" algn="l" defTabSz="914400" rtl="0" eaLnBrk="0" fontAlgn="base" latinLnBrk="0" hangingPunct="0">
-              <a:lnSpc>
-                <a:spcPct val="100000"/>
-              </a:lnSpc>
-              <a:spcBef>
-                <a:spcPct val="0"/>
-              </a:spcBef>
-              <a:spcAft>
-                <a:spcPct val="0"/>
-              </a:spcAft>
-              <a:buClrTx/>
-              <a:buSzTx/>
-              <a:tabLst/>
-            </a:pPr>
-            <a:r>
-              <a:rPr kumimoji="0" lang="en-US" altLang="en-US" sz="1800" b="1" i="0" u="none" strike="noStrike" cap="none" normalizeH="0" baseline="0" dirty="0">
-                <a:ln>
-                  <a:noFill/>
-                </a:ln>
-                <a:solidFill>
-                  <a:schemeClr val="bg1"/>
-                </a:solidFill>
-                <a:effectLst/>
-                <a:latin typeface="Apparat" panose="00000500000000000000" pitchFamily="50" charset="0"/>
-              </a:rPr>
-              <a:t>SMOTE</a:t>
-            </a:r>
-            <a:r>
-              <a:rPr kumimoji="0" lang="en-US" altLang="en-US" sz="1800" b="0" i="0" u="none" strike="noStrike" cap="none" normalizeH="0" baseline="0" dirty="0">
-                <a:ln>
-                  <a:noFill/>
-                </a:ln>
-                <a:solidFill>
-                  <a:schemeClr val="tx1"/>
-                </a:solidFill>
-                <a:effectLst/>
-                <a:latin typeface="Apparat" panose="00000500000000000000" pitchFamily="50" charset="0"/>
-              </a:rPr>
-              <a:t> applied to address class imbalance by oversampling minority class (mental health issues).</a:t>
-            </a:r>
           </a:p>
         </p:txBody>
       </p:sp>
@@ -8281,10 +8220,16 @@
           <a:lstStyle/>
           <a:p>
             <a:r>
+              <a:rPr lang="mk-MK" b="1" dirty="0">
+                <a:latin typeface="Apparat" panose="00000500000000000000" pitchFamily="50" charset="0"/>
+              </a:rPr>
+              <a:t>Примерен случај</a:t>
+            </a:r>
+            <a:r>
               <a:rPr lang="en-US" b="1" dirty="0">
                 <a:latin typeface="Apparat" panose="00000500000000000000" pitchFamily="50" charset="0"/>
               </a:rPr>
-              <a:t>Example Case:</a:t>
+              <a:t>:</a:t>
             </a:r>
             <a:endParaRPr lang="en-US" b="1" dirty="0">
               <a:solidFill>
@@ -8449,8 +8394,8 @@
         </p:nvSpPr>
         <p:spPr bwMode="auto">
           <a:xfrm>
-            <a:off x="465139" y="2150448"/>
-            <a:ext cx="11560606" cy="4185761"/>
+            <a:off x="465139" y="1894765"/>
+            <a:ext cx="11560606" cy="4801314"/>
           </a:xfrm>
           <a:prstGeom prst="rect">
             <a:avLst/>
@@ -8498,359 +8443,190 @@
           </a:bodyPr>
           <a:lstStyle/>
           <a:p>
-            <a:pPr marL="0" marR="0" lvl="0" indent="0" algn="l" defTabSz="914400" rtl="0" eaLnBrk="0" fontAlgn="base" latinLnBrk="0" hangingPunct="0">
-              <a:lnSpc>
-                <a:spcPct val="100000"/>
-              </a:lnSpc>
-              <a:spcBef>
-                <a:spcPct val="0"/>
-              </a:spcBef>
-              <a:spcAft>
-                <a:spcPct val="0"/>
-              </a:spcAft>
-              <a:buClrTx/>
-              <a:buSzTx/>
-              <a:tabLst/>
-            </a:pPr>
-            <a:r>
-              <a:rPr kumimoji="0" lang="en-US" altLang="en-US" sz="2400" b="1" i="0" u="none" strike="noStrike" cap="none" normalizeH="0" baseline="0" dirty="0">
-                <a:ln>
-                  <a:noFill/>
-                </a:ln>
-                <a:solidFill>
-                  <a:schemeClr val="bg1"/>
-                </a:solidFill>
-                <a:effectLst/>
-                <a:latin typeface="Apparat" panose="00000500000000000000" pitchFamily="50" charset="0"/>
-              </a:rPr>
-              <a:t>Fully Remote</a:t>
-            </a:r>
-            <a:r>
-              <a:rPr kumimoji="0" lang="en-US" altLang="en-US" sz="2400" b="0" i="0" u="none" strike="noStrike" cap="none" normalizeH="0" baseline="0" dirty="0">
-                <a:ln>
-                  <a:noFill/>
-                </a:ln>
-                <a:solidFill>
-                  <a:schemeClr val="bg1"/>
-                </a:solidFill>
-                <a:effectLst/>
-                <a:latin typeface="Apparat" panose="00000500000000000000" pitchFamily="50" charset="0"/>
-              </a:rPr>
-              <a:t>: High stress (4.2), isolation (4.5), low job satisfaction (3.1).</a:t>
-            </a:r>
-          </a:p>
-          <a:p>
-            <a:pPr marL="0" marR="0" lvl="0" indent="0" algn="l" defTabSz="914400" rtl="0" eaLnBrk="0" fontAlgn="base" latinLnBrk="0" hangingPunct="0">
-              <a:lnSpc>
-                <a:spcPct val="100000"/>
-              </a:lnSpc>
-              <a:spcBef>
-                <a:spcPct val="0"/>
-              </a:spcBef>
-              <a:spcAft>
-                <a:spcPct val="0"/>
-              </a:spcAft>
-              <a:buClrTx/>
-              <a:buSzTx/>
-              <a:tabLst/>
-            </a:pPr>
-            <a:r>
-              <a:rPr kumimoji="0" lang="en-US" altLang="en-US" sz="2400" b="1" i="0" u="none" strike="noStrike" cap="none" normalizeH="0" baseline="0" dirty="0">
-                <a:ln>
-                  <a:noFill/>
-                </a:ln>
-                <a:solidFill>
-                  <a:schemeClr val="bg1"/>
-                </a:solidFill>
-                <a:effectLst/>
+            <a:r>
+              <a:rPr lang="en-US" sz="2400" b="1" dirty="0">
+                <a:solidFill>
+                  <a:schemeClr val="bg1"/>
+                </a:solidFill>
+                <a:latin typeface="Apparat" panose="00000500000000000000" pitchFamily="50" charset="0"/>
+              </a:rPr>
+              <a:t>Remote</a:t>
+            </a:r>
+            <a:r>
+              <a:rPr lang="ru-RU" sz="2400" dirty="0">
+                <a:solidFill>
+                  <a:schemeClr val="bg1"/>
+                </a:solidFill>
+                <a:latin typeface="Apparat" panose="00000500000000000000" pitchFamily="50" charset="0"/>
+              </a:rPr>
+              <a:t>: Висок стрес (4.2), изолација (4.5), ниско задоволство од работата (3.1).</a:t>
+            </a:r>
+            <a:br>
+              <a:rPr lang="ru-RU" sz="2400" dirty="0">
+                <a:solidFill>
+                  <a:schemeClr val="bg1"/>
+                </a:solidFill>
+                <a:latin typeface="Apparat" panose="00000500000000000000" pitchFamily="50" charset="0"/>
+              </a:rPr>
+            </a:br>
+            <a:r>
+              <a:rPr lang="en-US" sz="2400" b="1" dirty="0">
+                <a:solidFill>
+                  <a:schemeClr val="bg1"/>
+                </a:solidFill>
                 <a:latin typeface="Apparat" panose="00000500000000000000" pitchFamily="50" charset="0"/>
               </a:rPr>
               <a:t>Hybrid</a:t>
             </a:r>
             <a:r>
-              <a:rPr kumimoji="0" lang="en-US" altLang="en-US" sz="2400" b="0" i="0" u="none" strike="noStrike" cap="none" normalizeH="0" baseline="0" dirty="0">
-                <a:ln>
-                  <a:noFill/>
-                </a:ln>
-                <a:solidFill>
-                  <a:schemeClr val="bg1"/>
-                </a:solidFill>
-                <a:effectLst/>
-                <a:latin typeface="Apparat" panose="00000500000000000000" pitchFamily="50" charset="0"/>
-              </a:rPr>
-              <a:t>: Moderate stress (3.6), isolation (3.1), high job satisfaction (4.0).</a:t>
-            </a:r>
-          </a:p>
-          <a:p>
-            <a:pPr marL="0" marR="0" lvl="0" indent="0" algn="l" defTabSz="914400" rtl="0" eaLnBrk="0" fontAlgn="base" latinLnBrk="0" hangingPunct="0">
-              <a:lnSpc>
-                <a:spcPct val="100000"/>
-              </a:lnSpc>
-              <a:spcBef>
-                <a:spcPct val="0"/>
-              </a:spcBef>
-              <a:spcAft>
-                <a:spcPct val="0"/>
-              </a:spcAft>
-              <a:buClrTx/>
-              <a:buSzTx/>
-              <a:tabLst/>
-            </a:pPr>
-            <a:r>
-              <a:rPr kumimoji="0" lang="en-US" altLang="en-US" sz="2400" b="1" i="0" u="none" strike="noStrike" cap="none" normalizeH="0" baseline="0" dirty="0">
-                <a:ln>
-                  <a:noFill/>
-                </a:ln>
-                <a:solidFill>
-                  <a:schemeClr val="bg1"/>
-                </a:solidFill>
-                <a:effectLst/>
+              <a:rPr lang="ru-RU" sz="2400" dirty="0">
+                <a:solidFill>
+                  <a:schemeClr val="bg1"/>
+                </a:solidFill>
+                <a:latin typeface="Apparat" panose="00000500000000000000" pitchFamily="50" charset="0"/>
+              </a:rPr>
+              <a:t>: Среден стрес (3.6), изолација (3.1), високо задоволство од работата (4.0).</a:t>
+            </a:r>
+            <a:br>
+              <a:rPr lang="ru-RU" sz="2400" dirty="0">
+                <a:solidFill>
+                  <a:schemeClr val="bg1"/>
+                </a:solidFill>
+                <a:latin typeface="Apparat" panose="00000500000000000000" pitchFamily="50" charset="0"/>
+              </a:rPr>
+            </a:br>
+            <a:r>
+              <a:rPr lang="en-US" sz="2400" b="1" dirty="0">
+                <a:solidFill>
+                  <a:schemeClr val="bg1"/>
+                </a:solidFill>
                 <a:latin typeface="Apparat" panose="00000500000000000000" pitchFamily="50" charset="0"/>
               </a:rPr>
               <a:t>Onsite</a:t>
             </a:r>
             <a:r>
-              <a:rPr kumimoji="0" lang="en-US" altLang="en-US" sz="2400" b="0" i="0" u="none" strike="noStrike" cap="none" normalizeH="0" baseline="0" dirty="0">
-                <a:ln>
-                  <a:noFill/>
-                </a:ln>
-                <a:solidFill>
-                  <a:schemeClr val="bg1"/>
-                </a:solidFill>
-                <a:effectLst/>
-                <a:latin typeface="Apparat" panose="00000500000000000000" pitchFamily="50" charset="0"/>
-              </a:rPr>
-              <a:t>: Moderate stress (3.8), isolation (2.7), moderate satisfaction (3.7).</a:t>
-            </a:r>
-          </a:p>
-          <a:p>
-            <a:pPr marL="0" marR="0" lvl="0" indent="0" algn="l" defTabSz="914400" rtl="0" eaLnBrk="0" fontAlgn="base" latinLnBrk="0" hangingPunct="0">
-              <a:lnSpc>
-                <a:spcPct val="100000"/>
-              </a:lnSpc>
-              <a:spcBef>
-                <a:spcPct val="0"/>
-              </a:spcBef>
-              <a:spcAft>
-                <a:spcPct val="0"/>
-              </a:spcAft>
-              <a:buClrTx/>
-              <a:buSzTx/>
-              <a:tabLst/>
-            </a:pPr>
-            <a:endParaRPr kumimoji="0" lang="en-US" altLang="en-US" sz="2400" b="0" i="0" u="none" strike="noStrike" cap="none" normalizeH="0" baseline="0" dirty="0">
-              <a:ln>
-                <a:noFill/>
-              </a:ln>
+              <a:rPr lang="ru-RU" sz="2400" dirty="0">
+                <a:solidFill>
+                  <a:schemeClr val="bg1"/>
+                </a:solidFill>
+                <a:latin typeface="Apparat" panose="00000500000000000000" pitchFamily="50" charset="0"/>
+              </a:rPr>
+              <a:t>: Среден стрес (3.8), изолација (2.7), средно задоволство (3.7).</a:t>
+            </a:r>
+          </a:p>
+          <a:p>
+            <a:endParaRPr lang="en-US" sz="2400" dirty="0">
               <a:solidFill>
                 <a:schemeClr val="bg1"/>
               </a:solidFill>
-              <a:effectLst/>
               <a:latin typeface="Apparat" panose="00000500000000000000" pitchFamily="50" charset="0"/>
             </a:endParaRPr>
           </a:p>
           <a:p>
-            <a:pPr marL="0" marR="0" lvl="0" indent="0" algn="l" defTabSz="914400" rtl="0" eaLnBrk="0" fontAlgn="base" latinLnBrk="0" hangingPunct="0">
-              <a:lnSpc>
-                <a:spcPct val="100000"/>
-              </a:lnSpc>
-              <a:spcBef>
-                <a:spcPct val="0"/>
-              </a:spcBef>
-              <a:spcAft>
-                <a:spcPct val="0"/>
-              </a:spcAft>
-              <a:buClrTx/>
-              <a:buSzTx/>
-              <a:tabLst/>
-            </a:pPr>
-            <a:endParaRPr kumimoji="0" lang="en-US" altLang="en-US" sz="2400" b="0" i="0" u="none" strike="noStrike" cap="none" normalizeH="0" baseline="0" dirty="0">
-              <a:ln>
-                <a:noFill/>
-              </a:ln>
+            <a:endParaRPr lang="en-US" sz="2400" dirty="0">
               <a:solidFill>
                 <a:schemeClr val="bg1"/>
               </a:solidFill>
-              <a:effectLst/>
               <a:latin typeface="Apparat" panose="00000500000000000000" pitchFamily="50" charset="0"/>
             </a:endParaRPr>
           </a:p>
           <a:p>
-            <a:pPr marL="0" marR="0" lvl="0" indent="0" algn="l" defTabSz="914400" rtl="0" eaLnBrk="0" fontAlgn="base" latinLnBrk="0" hangingPunct="0">
-              <a:lnSpc>
-                <a:spcPct val="100000"/>
-              </a:lnSpc>
-              <a:spcBef>
-                <a:spcPct val="0"/>
-              </a:spcBef>
-              <a:spcAft>
-                <a:spcPct val="0"/>
-              </a:spcAft>
-              <a:buClrTx/>
-              <a:buSzTx/>
-              <a:tabLst/>
-            </a:pPr>
-            <a:r>
-              <a:rPr kumimoji="0" lang="en-US" altLang="en-US" sz="2400" b="1" i="0" u="none" strike="noStrike" cap="none" normalizeH="0" baseline="0" dirty="0">
-                <a:ln>
-                  <a:noFill/>
-                </a:ln>
-                <a:solidFill>
-                  <a:schemeClr val="bg1"/>
-                </a:solidFill>
-                <a:effectLst/>
-                <a:latin typeface="Apparat" panose="00000500000000000000" pitchFamily="50" charset="0"/>
-              </a:rPr>
-              <a:t>Logistic Regression Findings</a:t>
-            </a:r>
-            <a:r>
-              <a:rPr kumimoji="0" lang="en-US" altLang="en-US" sz="2400" b="0" i="0" u="none" strike="noStrike" cap="none" normalizeH="0" baseline="0" dirty="0">
-                <a:ln>
-                  <a:noFill/>
-                </a:ln>
-                <a:solidFill>
-                  <a:schemeClr val="bg1"/>
-                </a:solidFill>
-                <a:effectLst/>
-                <a:latin typeface="Apparat" panose="00000500000000000000" pitchFamily="50" charset="0"/>
-              </a:rPr>
-              <a:t>:</a:t>
-            </a:r>
-          </a:p>
-          <a:p>
-            <a:pPr marL="0" marR="0" lvl="0" indent="0" algn="l" defTabSz="914400" rtl="0" eaLnBrk="0" fontAlgn="base" latinLnBrk="0" hangingPunct="0">
-              <a:lnSpc>
-                <a:spcPct val="100000"/>
-              </a:lnSpc>
-              <a:spcBef>
-                <a:spcPct val="0"/>
-              </a:spcBef>
-              <a:spcAft>
-                <a:spcPct val="0"/>
-              </a:spcAft>
-              <a:buClrTx/>
-              <a:buSzTx/>
-              <a:tabLst/>
-            </a:pPr>
-            <a:r>
-              <a:rPr kumimoji="0" lang="en-US" altLang="en-US" sz="2400" i="0" u="none" strike="noStrike" cap="none" normalizeH="0" baseline="0" dirty="0">
-                <a:ln>
-                  <a:noFill/>
-                </a:ln>
-                <a:solidFill>
-                  <a:schemeClr val="bg1"/>
-                </a:solidFill>
-                <a:effectLst/>
-                <a:latin typeface="Apparat" panose="00000500000000000000" pitchFamily="50" charset="0"/>
-              </a:rPr>
-              <a:t>Fully Remote</a:t>
-            </a:r>
-            <a:r>
-              <a:rPr kumimoji="0" lang="en-US" altLang="en-US" sz="2400" b="0" i="0" u="none" strike="noStrike" cap="none" normalizeH="0" baseline="0" dirty="0">
-                <a:ln>
-                  <a:noFill/>
-                </a:ln>
-                <a:solidFill>
-                  <a:schemeClr val="bg1"/>
-                </a:solidFill>
-                <a:effectLst/>
-                <a:latin typeface="Apparat" panose="00000500000000000000" pitchFamily="50" charset="0"/>
-              </a:rPr>
-              <a:t>: Stress (5), isolation (4.8) → </a:t>
-            </a:r>
-            <a:r>
-              <a:rPr kumimoji="0" lang="en-US" altLang="en-US" sz="3600" b="1" i="0" u="none" strike="noStrike" cap="none" normalizeH="0" baseline="0" dirty="0">
-                <a:ln>
-                  <a:noFill/>
-                </a:ln>
-                <a:solidFill>
-                  <a:schemeClr val="bg1"/>
-                </a:solidFill>
-                <a:effectLst/>
+            <a:r>
+              <a:rPr lang="ru-RU" sz="2400" dirty="0">
+                <a:solidFill>
+                  <a:schemeClr val="bg1"/>
+                </a:solidFill>
+                <a:latin typeface="Apparat" panose="00000500000000000000" pitchFamily="50" charset="0"/>
+              </a:rPr>
+              <a:t>Наоди од Логистичка Регресија:</a:t>
+            </a:r>
+            <a:br>
+              <a:rPr lang="ru-RU" sz="2400" dirty="0">
+                <a:solidFill>
+                  <a:schemeClr val="bg1"/>
+                </a:solidFill>
+                <a:latin typeface="Apparat" panose="00000500000000000000" pitchFamily="50" charset="0"/>
+              </a:rPr>
+            </a:br>
+            <a:r>
+              <a:rPr lang="en-US" sz="2400" b="1" dirty="0">
+                <a:solidFill>
+                  <a:schemeClr val="bg1"/>
+                </a:solidFill>
+                <a:latin typeface="Apparat" panose="00000500000000000000" pitchFamily="50" charset="0"/>
+              </a:rPr>
+              <a:t>Remote</a:t>
+            </a:r>
+            <a:r>
+              <a:rPr lang="ru-RU" sz="2400" dirty="0">
+                <a:solidFill>
+                  <a:schemeClr val="bg1"/>
+                </a:solidFill>
+                <a:latin typeface="Apparat" panose="00000500000000000000" pitchFamily="50" charset="0"/>
+              </a:rPr>
+              <a:t>: Стрес (5), изолација (4.8) → </a:t>
+            </a:r>
+            <a:r>
+              <a:rPr lang="ru-RU" sz="3600" b="1" dirty="0">
+                <a:solidFill>
+                  <a:schemeClr val="bg1"/>
+                </a:solidFill>
                 <a:latin typeface="Apparat" panose="00000500000000000000" pitchFamily="50" charset="0"/>
               </a:rPr>
               <a:t>70%</a:t>
             </a:r>
             <a:r>
-              <a:rPr kumimoji="0" lang="en-US" altLang="en-US" sz="2400" b="0" i="0" u="none" strike="noStrike" cap="none" normalizeH="0" baseline="0" dirty="0">
-                <a:ln>
-                  <a:noFill/>
-                </a:ln>
-                <a:solidFill>
-                  <a:schemeClr val="bg1"/>
-                </a:solidFill>
-                <a:effectLst/>
-                <a:latin typeface="Apparat" panose="00000500000000000000" pitchFamily="50" charset="0"/>
-              </a:rPr>
-              <a:t> probability of mental health issues.</a:t>
-            </a:r>
-          </a:p>
-          <a:p>
-            <a:pPr marL="0" marR="0" lvl="0" indent="0" algn="l" defTabSz="914400" rtl="0" eaLnBrk="0" fontAlgn="base" latinLnBrk="0" hangingPunct="0">
-              <a:lnSpc>
-                <a:spcPct val="100000"/>
-              </a:lnSpc>
-              <a:spcBef>
-                <a:spcPct val="0"/>
-              </a:spcBef>
-              <a:spcAft>
-                <a:spcPct val="0"/>
-              </a:spcAft>
-              <a:buClrTx/>
-              <a:buSzTx/>
-              <a:tabLst/>
-            </a:pPr>
-            <a:r>
-              <a:rPr kumimoji="0" lang="en-US" altLang="en-US" sz="2400" i="0" u="none" strike="noStrike" cap="none" normalizeH="0" baseline="0" dirty="0">
-                <a:ln>
-                  <a:noFill/>
-                </a:ln>
-                <a:solidFill>
-                  <a:schemeClr val="bg1"/>
-                </a:solidFill>
-                <a:effectLst/>
+              <a:rPr lang="ru-RU" sz="2400" dirty="0">
+                <a:solidFill>
+                  <a:schemeClr val="bg1"/>
+                </a:solidFill>
+                <a:latin typeface="Apparat" panose="00000500000000000000" pitchFamily="50" charset="0"/>
+              </a:rPr>
+              <a:t> веројатност за ментални здравствени проблеми.</a:t>
+            </a:r>
+            <a:br>
+              <a:rPr lang="ru-RU" sz="2400" dirty="0">
+                <a:solidFill>
+                  <a:schemeClr val="bg1"/>
+                </a:solidFill>
+                <a:latin typeface="Apparat" panose="00000500000000000000" pitchFamily="50" charset="0"/>
+              </a:rPr>
+            </a:br>
+            <a:r>
+              <a:rPr lang="en-US" sz="2400" b="1" dirty="0">
+                <a:solidFill>
+                  <a:schemeClr val="bg1"/>
+                </a:solidFill>
                 <a:latin typeface="Apparat" panose="00000500000000000000" pitchFamily="50" charset="0"/>
               </a:rPr>
               <a:t>Hybrid</a:t>
             </a:r>
             <a:r>
-              <a:rPr kumimoji="0" lang="en-US" altLang="en-US" sz="2400" b="0" i="0" u="none" strike="noStrike" cap="none" normalizeH="0" baseline="0" dirty="0">
-                <a:ln>
-                  <a:noFill/>
-                </a:ln>
-                <a:solidFill>
-                  <a:schemeClr val="bg1"/>
-                </a:solidFill>
-                <a:effectLst/>
-                <a:latin typeface="Apparat" panose="00000500000000000000" pitchFamily="50" charset="0"/>
-              </a:rPr>
-              <a:t>: Stress (3.2), isolation (3.0) → </a:t>
-            </a:r>
-            <a:r>
-              <a:rPr kumimoji="0" lang="en-US" altLang="en-US" sz="4400" b="1" i="0" u="none" strike="noStrike" cap="none" normalizeH="0" baseline="0" dirty="0">
-                <a:ln>
-                  <a:noFill/>
-                </a:ln>
-                <a:solidFill>
-                  <a:schemeClr val="bg1"/>
-                </a:solidFill>
-                <a:effectLst/>
+              <a:rPr lang="ru-RU" sz="2400" dirty="0">
+                <a:solidFill>
+                  <a:schemeClr val="bg1"/>
+                </a:solidFill>
+                <a:latin typeface="Apparat" panose="00000500000000000000" pitchFamily="50" charset="0"/>
+              </a:rPr>
+              <a:t>: Стрес (3.2), изолација (3.0) → </a:t>
+            </a:r>
+            <a:r>
+              <a:rPr lang="ru-RU" sz="3600" b="1" dirty="0">
+                <a:solidFill>
+                  <a:schemeClr val="bg1"/>
+                </a:solidFill>
                 <a:latin typeface="Apparat" panose="00000500000000000000" pitchFamily="50" charset="0"/>
               </a:rPr>
               <a:t>15%</a:t>
             </a:r>
             <a:r>
-              <a:rPr kumimoji="0" lang="en-US" altLang="en-US" sz="2400" b="0" i="0" u="none" strike="noStrike" cap="none" normalizeH="0" baseline="0" dirty="0">
-                <a:ln>
-                  <a:noFill/>
-                </a:ln>
-                <a:solidFill>
-                  <a:schemeClr val="bg1"/>
-                </a:solidFill>
-                <a:effectLst/>
-                <a:latin typeface="Apparat" panose="00000500000000000000" pitchFamily="50" charset="0"/>
-              </a:rPr>
-              <a:t> probability of mental health issues.</a:t>
+              <a:rPr lang="ru-RU" sz="2400" dirty="0">
+                <a:solidFill>
+                  <a:schemeClr val="bg1"/>
+                </a:solidFill>
+                <a:latin typeface="Apparat" panose="00000500000000000000" pitchFamily="50" charset="0"/>
+              </a:rPr>
+              <a:t> веројатност за ментални здравствени проблеми.</a:t>
             </a:r>
           </a:p>
           <a:p>
@@ -8989,8 +8765,8 @@
         </p:nvSpPr>
         <p:spPr>
           <a:xfrm>
-            <a:off x="366496" y="1039030"/>
-            <a:ext cx="5529261" cy="5541818"/>
+            <a:off x="366496" y="2418347"/>
+            <a:ext cx="5529261" cy="2241520"/>
           </a:xfrm>
         </p:spPr>
         <p:txBody>
@@ -9000,127 +8776,65 @@
           <a:lstStyle/>
           <a:p>
             <a:r>
-              <a:rPr lang="en-US" sz="2400" dirty="0">
-                <a:solidFill>
-                  <a:schemeClr val="bg1"/>
-                </a:solidFill>
-              </a:rPr>
-              <a:t>Accuracy Increased from 0.3 to 0.4 after applying </a:t>
-            </a:r>
-            <a:r>
-              <a:rPr lang="en-US" sz="2400" b="1" dirty="0">
-                <a:solidFill>
-                  <a:schemeClr val="bg1"/>
-                </a:solidFill>
+              <a:rPr lang="ru-RU" sz="2000" dirty="0">
+                <a:solidFill>
+                  <a:schemeClr val="bg1"/>
+                </a:solidFill>
+                <a:latin typeface="Apparat" panose="00000500000000000000" pitchFamily="50" charset="0"/>
+              </a:rPr>
+              <a:t>Точноста се зголеми од 0.3 на 0.4 по примената на </a:t>
+            </a:r>
+            <a:r>
+              <a:rPr lang="ru-RU" sz="2000" b="1" dirty="0">
+                <a:solidFill>
+                  <a:schemeClr val="bg1"/>
+                </a:solidFill>
+                <a:latin typeface="Apparat" panose="00000500000000000000" pitchFamily="50" charset="0"/>
               </a:rPr>
               <a:t>SMOTE</a:t>
             </a:r>
             <a:r>
-              <a:rPr lang="en-US" sz="2400" dirty="0">
-                <a:solidFill>
-                  <a:schemeClr val="bg1"/>
-                </a:solidFill>
+              <a:rPr lang="ru-RU" sz="2000" dirty="0">
+                <a:solidFill>
+                  <a:schemeClr val="bg1"/>
+                </a:solidFill>
+                <a:latin typeface="Apparat" panose="00000500000000000000" pitchFamily="50" charset="0"/>
               </a:rPr>
               <a:t>.</a:t>
             </a:r>
             <a:br>
-              <a:rPr lang="en-US" sz="2400" dirty="0">
-                <a:solidFill>
-                  <a:schemeClr val="bg1"/>
-                </a:solidFill>
+              <a:rPr lang="en-US" sz="2000" dirty="0">
+                <a:solidFill>
+                  <a:schemeClr val="bg1"/>
+                </a:solidFill>
+                <a:latin typeface="Apparat" panose="00000500000000000000" pitchFamily="50" charset="0"/>
               </a:rPr>
             </a:br>
             <a:br>
-              <a:rPr lang="en-US" sz="2400" dirty="0">
-                <a:solidFill>
-                  <a:schemeClr val="bg1"/>
-                </a:solidFill>
+              <a:rPr lang="ru-RU" sz="2000" dirty="0">
+                <a:solidFill>
+                  <a:schemeClr val="bg1"/>
+                </a:solidFill>
+                <a:latin typeface="Apparat" panose="00000500000000000000" pitchFamily="50" charset="0"/>
               </a:rPr>
             </a:br>
             <a:r>
-              <a:rPr lang="en-US" sz="2400" b="1" dirty="0">
-                <a:solidFill>
-                  <a:schemeClr val="bg1"/>
-                </a:solidFill>
-              </a:rPr>
-              <a:t>Key Findings</a:t>
-            </a:r>
-            <a:r>
-              <a:rPr lang="en-US" sz="2400" dirty="0">
-                <a:solidFill>
-                  <a:schemeClr val="bg1"/>
-                </a:solidFill>
-              </a:rPr>
-              <a:t>:</a:t>
-            </a:r>
-            <a:br>
-              <a:rPr lang="en-US" sz="2400" dirty="0">
-                <a:solidFill>
-                  <a:schemeClr val="bg1"/>
-                </a:solidFill>
-              </a:rPr>
-            </a:br>
-            <a:r>
-              <a:rPr lang="en-US" sz="2400" b="1" dirty="0">
-                <a:solidFill>
-                  <a:schemeClr val="bg1"/>
-                </a:solidFill>
-              </a:rPr>
-              <a:t>Positive predictors</a:t>
-            </a:r>
-            <a:r>
-              <a:rPr lang="en-US" sz="2400" dirty="0">
-                <a:solidFill>
-                  <a:schemeClr val="bg1"/>
-                </a:solidFill>
-              </a:rPr>
-              <a:t> of better mental health: Sales and Software Engineer roles, IT and Retail industries, mental health resources, and regions like Asia.</a:t>
-            </a:r>
-            <a:br>
-              <a:rPr lang="en-US" sz="2400" dirty="0">
-                <a:solidFill>
-                  <a:schemeClr val="bg1"/>
-                </a:solidFill>
-              </a:rPr>
-            </a:br>
-            <a:r>
-              <a:rPr lang="en-US" sz="2400" b="1" dirty="0">
-                <a:solidFill>
-                  <a:schemeClr val="bg1"/>
-                </a:solidFill>
-              </a:rPr>
-              <a:t>Negative predictors</a:t>
-            </a:r>
-            <a:r>
-              <a:rPr lang="en-US" sz="2400" dirty="0">
-                <a:solidFill>
-                  <a:schemeClr val="bg1"/>
-                </a:solidFill>
-              </a:rPr>
-              <a:t>: Designer roles, Healthcare industry, poor sleep quality, and medium stress levels.</a:t>
-            </a:r>
-            <a:br>
-              <a:rPr lang="en-US" sz="2400" dirty="0">
-                <a:solidFill>
-                  <a:schemeClr val="bg1"/>
-                </a:solidFill>
-              </a:rPr>
-            </a:br>
-            <a:r>
-              <a:rPr lang="en-US" sz="2400" b="1" dirty="0">
-                <a:solidFill>
-                  <a:schemeClr val="bg1"/>
-                </a:solidFill>
-              </a:rPr>
-              <a:t>Key Insight</a:t>
-            </a:r>
-            <a:r>
-              <a:rPr lang="en-US" sz="2400" dirty="0">
-                <a:solidFill>
-                  <a:schemeClr val="bg1"/>
-                </a:solidFill>
-              </a:rPr>
-              <a:t>: Logistic Regression effectively predicted "Burnout" instances (722 identified).</a:t>
+              <a:rPr lang="ru-RU" sz="2000" b="1" dirty="0">
+                <a:solidFill>
+                  <a:schemeClr val="bg1"/>
+                </a:solidFill>
+                <a:latin typeface="Apparat" panose="00000500000000000000" pitchFamily="50" charset="0"/>
+              </a:rPr>
+              <a:t>Клучен Увид:</a:t>
+            </a:r>
+            <a:r>
+              <a:rPr lang="ru-RU" sz="2000" dirty="0">
+                <a:solidFill>
+                  <a:schemeClr val="bg1"/>
+                </a:solidFill>
+                <a:latin typeface="Apparat" panose="00000500000000000000" pitchFamily="50" charset="0"/>
+              </a:rPr>
+              <a:t> Логистичка регресија ефективно ги предвиде случаите на "потполност" (722 идентификувани).</a:t>
             </a:r>
           </a:p>
         </p:txBody>
@@ -9277,8 +8991,8 @@
         </p:nvSpPr>
         <p:spPr>
           <a:xfrm>
-            <a:off x="366496" y="717844"/>
-            <a:ext cx="6119090" cy="523220"/>
+            <a:off x="366496" y="1335382"/>
+            <a:ext cx="6119090" cy="954107"/>
           </a:xfrm>
           <a:prstGeom prst="rect">
             <a:avLst/>
@@ -9292,15 +9006,18 @@
           <a:lstStyle/>
           <a:p>
             <a:r>
-              <a:rPr lang="en-US" sz="2800" b="1" dirty="0">
-                <a:solidFill>
-                  <a:schemeClr val="bg1"/>
-                </a:solidFill>
-                <a:latin typeface="Apparat" panose="00000500000000000000" pitchFamily="50" charset="0"/>
-              </a:rPr>
-              <a:t>Logistic Regression Results</a:t>
-            </a:r>
-            <a:endParaRPr lang="en-US" sz="2800" dirty="0">
+              <a:rPr lang="mk-MK" sz="2800" b="1" dirty="0">
+                <a:solidFill>
+                  <a:schemeClr val="bg1"/>
+                </a:solidFill>
+                <a:latin typeface="Apparat" panose="00000500000000000000" pitchFamily="50" charset="0"/>
+              </a:rPr>
+              <a:t>Резултати од Логистичка Регресија</a:t>
+            </a:r>
+            <a:endParaRPr lang="en-US" sz="2800" b="1" dirty="0">
+              <a:solidFill>
+                <a:schemeClr val="bg1"/>
+              </a:solidFill>
               <a:latin typeface="Apparat" panose="00000500000000000000" pitchFamily="50" charset="0"/>
             </a:endParaRPr>
           </a:p>
@@ -9448,8 +9165,8 @@
         </p:nvSpPr>
         <p:spPr>
           <a:xfrm>
-            <a:off x="221025" y="983612"/>
-            <a:ext cx="4165822" cy="5541818"/>
+            <a:off x="110513" y="791107"/>
+            <a:ext cx="4311293" cy="5541818"/>
           </a:xfrm>
         </p:spPr>
         <p:txBody>
@@ -9459,63 +9176,175 @@
           <a:lstStyle/>
           <a:p>
             <a:r>
-              <a:rPr lang="en-US" sz="2400" b="1" dirty="0">
-                <a:solidFill>
-                  <a:schemeClr val="bg1"/>
-                </a:solidFill>
-              </a:rPr>
-              <a:t>Positive predictors</a:t>
-            </a:r>
-            <a:r>
-              <a:rPr lang="en-US" sz="2400" dirty="0">
-                <a:solidFill>
-                  <a:schemeClr val="bg1"/>
-                </a:solidFill>
-              </a:rPr>
-              <a:t> of better mental health: Sales and Software Engineer roles, IT and Retail industries, mental health resources, and regions like Asia.</a:t>
+              <a:rPr lang="ru-RU" sz="2000" b="1" dirty="0">
+                <a:solidFill>
+                  <a:schemeClr val="bg1"/>
+                </a:solidFill>
+                <a:latin typeface="Apparat" panose="00000500000000000000" pitchFamily="50" charset="0"/>
+              </a:rPr>
+              <a:t>Позитивни предиктори за подобро ментално здравје:</a:t>
             </a:r>
             <a:br>
-              <a:rPr lang="en-US" sz="2400" dirty="0">
-                <a:solidFill>
-                  <a:schemeClr val="bg1"/>
-                </a:solidFill>
+              <a:rPr lang="ru-RU" sz="2000" dirty="0">
+                <a:solidFill>
+                  <a:schemeClr val="bg1"/>
+                </a:solidFill>
+                <a:latin typeface="Apparat" panose="00000500000000000000" pitchFamily="50" charset="0"/>
+              </a:rPr>
+            </a:br>
+            <a:r>
+              <a:rPr lang="ru-RU" sz="2000" dirty="0">
+                <a:solidFill>
+                  <a:schemeClr val="bg1"/>
+                </a:solidFill>
+                <a:latin typeface="Apparat" panose="00000500000000000000" pitchFamily="50" charset="0"/>
+              </a:rPr>
+              <a:t>Роли како продавач и софтверски инженер,</a:t>
+            </a:r>
+            <a:br>
+              <a:rPr lang="ru-RU" sz="2000" dirty="0">
+                <a:solidFill>
+                  <a:schemeClr val="bg1"/>
+                </a:solidFill>
+                <a:latin typeface="Apparat" panose="00000500000000000000" pitchFamily="50" charset="0"/>
+              </a:rPr>
+            </a:br>
+            <a:r>
+              <a:rPr lang="ru-RU" sz="2000" dirty="0">
+                <a:solidFill>
+                  <a:schemeClr val="bg1"/>
+                </a:solidFill>
+                <a:latin typeface="Apparat" panose="00000500000000000000" pitchFamily="50" charset="0"/>
+              </a:rPr>
+              <a:t>Индустрии како ИТ и малопродажба,</a:t>
+            </a:r>
+            <a:br>
+              <a:rPr lang="ru-RU" sz="2000" dirty="0">
+                <a:solidFill>
+                  <a:schemeClr val="bg1"/>
+                </a:solidFill>
+                <a:latin typeface="Apparat" panose="00000500000000000000" pitchFamily="50" charset="0"/>
+              </a:rPr>
+            </a:br>
+            <a:r>
+              <a:rPr lang="ru-RU" sz="2000" dirty="0">
+                <a:solidFill>
+                  <a:schemeClr val="bg1"/>
+                </a:solidFill>
+                <a:latin typeface="Apparat" panose="00000500000000000000" pitchFamily="50" charset="0"/>
+              </a:rPr>
+              <a:t>Ресурси за ментално здравје,</a:t>
+            </a:r>
+            <a:br>
+              <a:rPr lang="ru-RU" sz="2000" dirty="0">
+                <a:solidFill>
+                  <a:schemeClr val="bg1"/>
+                </a:solidFill>
+                <a:latin typeface="Apparat" panose="00000500000000000000" pitchFamily="50" charset="0"/>
+              </a:rPr>
+            </a:br>
+            <a:r>
+              <a:rPr lang="ru-RU" sz="2000" dirty="0">
+                <a:solidFill>
+                  <a:schemeClr val="bg1"/>
+                </a:solidFill>
+                <a:latin typeface="Apparat" panose="00000500000000000000" pitchFamily="50" charset="0"/>
+              </a:rPr>
+              <a:t>Регии како Азија.</a:t>
+            </a:r>
+            <a:br>
+              <a:rPr lang="en-US" sz="2000" dirty="0">
+                <a:solidFill>
+                  <a:schemeClr val="bg1"/>
+                </a:solidFill>
+                <a:latin typeface="Apparat" panose="00000500000000000000" pitchFamily="50" charset="0"/>
               </a:rPr>
             </a:br>
             <a:br>
-              <a:rPr lang="en-US" sz="2400" dirty="0">
-                <a:solidFill>
-                  <a:schemeClr val="bg1"/>
-                </a:solidFill>
+              <a:rPr lang="ru-RU" sz="2000" dirty="0">
+                <a:solidFill>
+                  <a:schemeClr val="bg1"/>
+                </a:solidFill>
+                <a:latin typeface="Apparat" panose="00000500000000000000" pitchFamily="50" charset="0"/>
               </a:rPr>
             </a:br>
             <a:r>
-              <a:rPr lang="en-US" sz="2400" b="1" dirty="0">
-                <a:solidFill>
-                  <a:schemeClr val="bg1"/>
-                </a:solidFill>
-              </a:rPr>
-              <a:t>Negative predictors</a:t>
-            </a:r>
-            <a:r>
-              <a:rPr lang="en-US" sz="2400" dirty="0">
-                <a:solidFill>
-                  <a:schemeClr val="bg1"/>
-                </a:solidFill>
-              </a:rPr>
-              <a:t>: Designer roles, Healthcare industry, poor sleep quality, and medium stress levels.</a:t>
+              <a:rPr lang="ru-RU" sz="2000" b="1" dirty="0">
+                <a:solidFill>
+                  <a:schemeClr val="bg1"/>
+                </a:solidFill>
+                <a:latin typeface="Apparat" panose="00000500000000000000" pitchFamily="50" charset="0"/>
+              </a:rPr>
+              <a:t>Негативни предиктори:</a:t>
             </a:r>
             <a:br>
-              <a:rPr lang="en-US" sz="2400" dirty="0">
-                <a:solidFill>
-                  <a:schemeClr val="bg1"/>
-                </a:solidFill>
+              <a:rPr lang="ru-RU" sz="2000" dirty="0">
+                <a:solidFill>
+                  <a:schemeClr val="bg1"/>
+                </a:solidFill>
+                <a:latin typeface="Apparat" panose="00000500000000000000" pitchFamily="50" charset="0"/>
               </a:rPr>
             </a:br>
-            <a:endParaRPr lang="en-US" sz="2400" dirty="0">
-              <a:solidFill>
-                <a:schemeClr val="bg1"/>
-              </a:solidFill>
-            </a:endParaRPr>
+            <a:r>
+              <a:rPr lang="ru-RU" sz="2000" dirty="0">
+                <a:solidFill>
+                  <a:schemeClr val="bg1"/>
+                </a:solidFill>
+                <a:latin typeface="Apparat" panose="00000500000000000000" pitchFamily="50" charset="0"/>
+              </a:rPr>
+              <a:t>Роли како дизајнер,</a:t>
+            </a:r>
+            <a:br>
+              <a:rPr lang="ru-RU" sz="2000" dirty="0">
+                <a:solidFill>
+                  <a:schemeClr val="bg1"/>
+                </a:solidFill>
+                <a:latin typeface="Apparat" panose="00000500000000000000" pitchFamily="50" charset="0"/>
+              </a:rPr>
+            </a:br>
+            <a:r>
+              <a:rPr lang="ru-RU" sz="2000" dirty="0">
+                <a:solidFill>
+                  <a:schemeClr val="bg1"/>
+                </a:solidFill>
+                <a:latin typeface="Apparat" panose="00000500000000000000" pitchFamily="50" charset="0"/>
+              </a:rPr>
+              <a:t>Индустрија за здравствена грижа,</a:t>
+            </a:r>
+            <a:br>
+              <a:rPr lang="ru-RU" sz="2000" dirty="0">
+                <a:solidFill>
+                  <a:schemeClr val="bg1"/>
+                </a:solidFill>
+                <a:latin typeface="Apparat" panose="00000500000000000000" pitchFamily="50" charset="0"/>
+              </a:rPr>
+            </a:br>
+            <a:r>
+              <a:rPr lang="ru-RU" sz="2000" dirty="0">
+                <a:solidFill>
+                  <a:schemeClr val="bg1"/>
+                </a:solidFill>
+                <a:latin typeface="Apparat" panose="00000500000000000000" pitchFamily="50" charset="0"/>
+              </a:rPr>
+              <a:t>Лоша квалитет на спиење,</a:t>
+            </a:r>
+            <a:br>
+              <a:rPr lang="ru-RU" sz="2000" dirty="0">
+                <a:solidFill>
+                  <a:schemeClr val="bg1"/>
+                </a:solidFill>
+                <a:latin typeface="Apparat" panose="00000500000000000000" pitchFamily="50" charset="0"/>
+              </a:rPr>
+            </a:br>
+            <a:r>
+              <a:rPr lang="ru-RU" sz="2000" dirty="0">
+                <a:solidFill>
+                  <a:schemeClr val="bg1"/>
+                </a:solidFill>
+                <a:latin typeface="Apparat" panose="00000500000000000000" pitchFamily="50" charset="0"/>
+              </a:rPr>
+              <a:t>Средно ниво на стрес.</a:t>
+            </a:r>
           </a:p>
         </p:txBody>
       </p:sp>
@@ -9653,49 +9482,6 @@
               </a:solidFill>
               <a:effectLst/>
               <a:latin typeface="Arial" panose="020B0604020202020204" pitchFamily="34" charset="0"/>
-            </a:endParaRPr>
-          </a:p>
-        </p:txBody>
-      </p:sp>
-      <p:sp>
-        <p:nvSpPr>
-          <p:cNvPr id="5" name="TextBox 4">
-            <a:extLst>
-              <a:ext uri="{FF2B5EF4-FFF2-40B4-BE49-F238E27FC236}">
-                <a16:creationId xmlns:a16="http://schemas.microsoft.com/office/drawing/2014/main" id="{B9B14A5C-780C-4B6A-1259-71BCFC7E5A09}"/>
-              </a:ext>
-            </a:extLst>
-          </p:cNvPr>
-          <p:cNvSpPr txBox="1"/>
-          <p:nvPr/>
-        </p:nvSpPr>
-        <p:spPr>
-          <a:xfrm>
-            <a:off x="221025" y="745554"/>
-            <a:ext cx="3639775" cy="954107"/>
-          </a:xfrm>
-          <a:prstGeom prst="rect">
-            <a:avLst/>
-          </a:prstGeom>
-          <a:noFill/>
-        </p:spPr>
-        <p:txBody>
-          <a:bodyPr wrap="square">
-            <a:spAutoFit/>
-          </a:bodyPr>
-          <a:lstStyle/>
-          <a:p>
-            <a:r>
-              <a:rPr lang="en-US" sz="2800" b="1" dirty="0">
-                <a:solidFill>
-                  <a:schemeClr val="bg1"/>
-                </a:solidFill>
-                <a:latin typeface="Apparat" panose="00000500000000000000" pitchFamily="50" charset="0"/>
-              </a:rPr>
-              <a:t>Logistic Regression Results</a:t>
-            </a:r>
-            <a:endParaRPr lang="en-US" sz="2800" dirty="0">
-              <a:latin typeface="Apparat" panose="00000500000000000000" pitchFamily="50" charset="0"/>
             </a:endParaRPr>
           </a:p>
         </p:txBody>
@@ -9854,25 +9640,25 @@
           <a:p>
             <a:pPr algn="r"/>
             <a:r>
-              <a:rPr lang="en-US" sz="2400" b="1" dirty="0">
-                <a:solidFill>
-                  <a:schemeClr val="bg1"/>
-                </a:solidFill>
-                <a:latin typeface="Apparat" panose="00000500000000000000" pitchFamily="50" charset="0"/>
-              </a:rPr>
-              <a:t>Accuracy</a:t>
-            </a:r>
-            <a:r>
-              <a:rPr lang="en-US" sz="2400" dirty="0">
-                <a:solidFill>
-                  <a:schemeClr val="bg1"/>
-                </a:solidFill>
-                <a:latin typeface="Apparat" panose="00000500000000000000" pitchFamily="50" charset="0"/>
-              </a:rPr>
-              <a:t>: Achieved 0.5 accuracy.</a:t>
+              <a:rPr lang="ru-RU" sz="2400" b="1" dirty="0">
+                <a:solidFill>
+                  <a:schemeClr val="bg1"/>
+                </a:solidFill>
+                <a:latin typeface="Apparat" panose="00000500000000000000" pitchFamily="50" charset="0"/>
+              </a:rPr>
+              <a:t>Точност:</a:t>
+            </a:r>
+            <a:r>
+              <a:rPr lang="ru-RU" sz="2400" dirty="0">
+                <a:solidFill>
+                  <a:schemeClr val="bg1"/>
+                </a:solidFill>
+                <a:latin typeface="Apparat" panose="00000500000000000000" pitchFamily="50" charset="0"/>
+              </a:rPr>
+              <a:t> Постигната точност од 0.5.</a:t>
             </a:r>
             <a:br>
-              <a:rPr lang="en-US" sz="2400" dirty="0">
+              <a:rPr lang="ru-RU" sz="2400" dirty="0">
                 <a:solidFill>
                   <a:schemeClr val="bg1"/>
                 </a:solidFill>
@@ -9888,25 +9674,16 @@
               </a:rPr>
             </a:br>
             <a:r>
-              <a:rPr lang="en-US" sz="2400" b="1" dirty="0">
-                <a:solidFill>
-                  <a:schemeClr val="bg1"/>
-                </a:solidFill>
-                <a:latin typeface="Apparat" panose="00000500000000000000" pitchFamily="50" charset="0"/>
-              </a:rPr>
-              <a:t>Prediction Challenges</a:t>
-            </a:r>
-            <a:r>
-              <a:rPr lang="en-US" sz="2400" dirty="0">
-                <a:solidFill>
-                  <a:schemeClr val="bg1"/>
-                </a:solidFill>
-                <a:latin typeface="Apparat" panose="00000500000000000000" pitchFamily="50" charset="0"/>
-              </a:rPr>
-              <a:t>:</a:t>
+              <a:rPr lang="ru-RU" sz="2400" b="1" dirty="0">
+                <a:solidFill>
+                  <a:schemeClr val="bg1"/>
+                </a:solidFill>
+                <a:latin typeface="Apparat" panose="00000500000000000000" pitchFamily="50" charset="0"/>
+              </a:rPr>
+              <a:t>Предизвици во Прогнозирањето:</a:t>
             </a:r>
             <a:br>
-              <a:rPr lang="en-US" sz="2400" dirty="0">
+              <a:rPr lang="ru-RU" sz="2400" dirty="0">
                 <a:solidFill>
                   <a:schemeClr val="bg1"/>
                 </a:solidFill>
@@ -9914,16 +9691,33 @@
               </a:rPr>
             </a:br>
             <a:r>
-              <a:rPr lang="en-US" sz="2400" dirty="0">
-                <a:solidFill>
-                  <a:schemeClr val="bg1"/>
-                </a:solidFill>
-                <a:latin typeface="Apparat" panose="00000500000000000000" pitchFamily="50" charset="0"/>
-              </a:rPr>
-              <a:t>High accuracy for office workers.</a:t>
+              <a:rPr lang="ru-RU" sz="2400" dirty="0">
+                <a:solidFill>
+                  <a:schemeClr val="bg1"/>
+                </a:solidFill>
+                <a:latin typeface="Apparat" panose="00000500000000000000" pitchFamily="50" charset="0"/>
+              </a:rPr>
+              <a:t>Висока точност за канцелариски работници.</a:t>
             </a:r>
             <a:br>
-              <a:rPr lang="en-US" sz="2400" dirty="0">
+              <a:rPr lang="ru-RU" sz="2400" dirty="0">
+                <a:solidFill>
+                  <a:schemeClr val="bg1"/>
+                </a:solidFill>
+                <a:latin typeface="Apparat" panose="00000500000000000000" pitchFamily="50" charset="0"/>
+              </a:rPr>
+            </a:br>
+            <a:r>
+              <a:rPr lang="ru-RU" sz="2400" dirty="0">
+                <a:solidFill>
+                  <a:schemeClr val="bg1"/>
+                </a:solidFill>
+                <a:latin typeface="Apparat" panose="00000500000000000000" pitchFamily="50" charset="0"/>
+              </a:rPr>
+              <a:t>Средна точност за оддалечени работници.</a:t>
+            </a:r>
+            <a:br>
+              <a:rPr lang="ru-RU" sz="2400" dirty="0">
                 <a:solidFill>
                   <a:schemeClr val="bg1"/>
                 </a:solidFill>
@@ -9939,38 +9733,22 @@
               </a:rPr>
             </a:br>
             <a:r>
-              <a:rPr lang="en-US" sz="2400" dirty="0">
-                <a:solidFill>
-                  <a:schemeClr val="bg1"/>
-                </a:solidFill>
-                <a:latin typeface="Apparat" panose="00000500000000000000" pitchFamily="50" charset="0"/>
-              </a:rPr>
-              <a:t>Moderate accuracy for remote workers.</a:t>
-            </a:r>
-            <a:br>
-              <a:rPr lang="en-US" sz="2400" dirty="0">
-                <a:solidFill>
-                  <a:schemeClr val="bg1"/>
-                </a:solidFill>
-                <a:latin typeface="Apparat" panose="00000500000000000000" pitchFamily="50" charset="0"/>
-              </a:rPr>
-            </a:br>
-            <a:br>
-              <a:rPr lang="en-US" sz="2400" dirty="0">
-                <a:solidFill>
-                  <a:schemeClr val="bg1"/>
-                </a:solidFill>
-                <a:latin typeface="Apparat" panose="00000500000000000000" pitchFamily="50" charset="0"/>
-              </a:rPr>
-            </a:br>
-            <a:r>
-              <a:rPr lang="en-US" sz="2400" dirty="0">
-                <a:solidFill>
-                  <a:schemeClr val="bg1"/>
-                </a:solidFill>
-                <a:latin typeface="Apparat" panose="00000500000000000000" pitchFamily="50" charset="0"/>
-              </a:rPr>
-              <a:t>Poor accuracy for hybrid workers—variability in individual experiences likely caused this.</a:t>
+              <a:rPr lang="ru-RU" sz="2400" b="1" dirty="0">
+                <a:solidFill>
+                  <a:schemeClr val="bg1"/>
+                </a:solidFill>
+                <a:latin typeface="Apparat" panose="00000500000000000000" pitchFamily="50" charset="0"/>
+              </a:rPr>
+              <a:t>Ниска точност за хибридни работници </a:t>
+            </a:r>
+            <a:r>
+              <a:rPr lang="ru-RU" sz="2400" dirty="0">
+                <a:solidFill>
+                  <a:schemeClr val="bg1"/>
+                </a:solidFill>
+                <a:latin typeface="Apparat" panose="00000500000000000000" pitchFamily="50" charset="0"/>
+              </a:rPr>
+              <a:t>— веројатно поради варијабилноста во индивидуалните искуства.</a:t>
             </a:r>
           </a:p>
         </p:txBody>
@@ -10128,7 +9906,7 @@
         <p:spPr>
           <a:xfrm>
             <a:off x="8406753" y="173988"/>
-            <a:ext cx="3639775" cy="954107"/>
+            <a:ext cx="3639775" cy="523220"/>
           </a:xfrm>
           <a:prstGeom prst="rect">
             <a:avLst/>
@@ -10149,8 +9927,23 @@
                 </a:solidFill>
                 <a:latin typeface="Apparat" panose="00000500000000000000" pitchFamily="50" charset="0"/>
               </a:rPr>
-              <a:t>Support Vector Machine Results</a:t>
-            </a:r>
+              <a:t>SVM </a:t>
+            </a:r>
+            <a:r>
+              <a:rPr lang="mk-MK" sz="2800" b="1" dirty="0">
+                <a:solidFill>
+                  <a:schemeClr val="bg1"/>
+                </a:solidFill>
+                <a:latin typeface="Apparat" panose="00000500000000000000" pitchFamily="50" charset="0"/>
+              </a:rPr>
+              <a:t>Резултати</a:t>
+            </a:r>
+            <a:endParaRPr lang="en-US" sz="2800" b="1" dirty="0">
+              <a:solidFill>
+                <a:schemeClr val="bg1"/>
+              </a:solidFill>
+              <a:latin typeface="Apparat" panose="00000500000000000000" pitchFamily="50" charset="0"/>
+            </a:endParaRPr>
           </a:p>
         </p:txBody>
       </p:sp>

</xml_diff>